<commit_message>
Documento word del proyecto
</commit_message>
<xml_diff>
--- a/app/app_documentacion/1er_trim/1_1_1_presentacion_proyecto.pptx
+++ b/app/app_documentacion/1er_trim/1_1_1_presentacion_proyecto.pptx
@@ -220,7 +220,7 @@
           <a:p>
             <a:fld id="{7E6DFAF8-F7BA-48F4-B956-3CC1A9ACF6C9}" type="datetimeFigureOut">
               <a:rPr lang="es-CO" smtClean="0"/>
-              <a:t>28/11/2021</a:t>
+              <a:t>3/12/2021</a:t>
             </a:fld>
             <a:endParaRPr lang="es-CO"/>
           </a:p>
@@ -543,6 +543,90 @@
             <a:spLocks noGrp="1"/>
           </p:cNvSpPr>
           <p:nvPr>
+            <p:ph type="sldNum" sz="quarter" idx="5"/>
+          </p:nvPr>
+        </p:nvSpPr>
+        <p:spPr/>
+        <p:txBody>
+          <a:bodyPr/>
+          <a:lstStyle/>
+          <a:p>
+            <a:fld id="{7379F110-F3B2-4F4E-B872-D426D1629FD8}" type="slidenum">
+              <a:rPr lang="es-CO" smtClean="0"/>
+              <a:t>1</a:t>
+            </a:fld>
+            <a:endParaRPr lang="es-CO"/>
+          </a:p>
+        </p:txBody>
+      </p:sp>
+    </p:spTree>
+    <p:extLst>
+      <p:ext uri="{BB962C8B-B14F-4D97-AF65-F5344CB8AC3E}">
+        <p14:creationId xmlns:p14="http://schemas.microsoft.com/office/powerpoint/2010/main" val="3086146248"/>
+      </p:ext>
+    </p:extLst>
+  </p:cSld>
+  <p:clrMapOvr>
+    <a:masterClrMapping/>
+  </p:clrMapOvr>
+</p:notes>
+</file>
+
+<file path=ppt/notesSlides/notesSlide2.xml><?xml version="1.0" encoding="utf-8"?>
+<p:notes xmlns:a="http://schemas.openxmlformats.org/drawingml/2006/main" xmlns:r="http://schemas.openxmlformats.org/officeDocument/2006/relationships" xmlns:p="http://schemas.openxmlformats.org/presentationml/2006/main">
+  <p:cSld>
+    <p:spTree>
+      <p:nvGrpSpPr>
+        <p:cNvPr id="1" name=""/>
+        <p:cNvGrpSpPr/>
+        <p:nvPr/>
+      </p:nvGrpSpPr>
+      <p:grpSpPr>
+        <a:xfrm>
+          <a:off x="0" y="0"/>
+          <a:ext cx="0" cy="0"/>
+          <a:chOff x="0" y="0"/>
+          <a:chExt cx="0" cy="0"/>
+        </a:xfrm>
+      </p:grpSpPr>
+      <p:sp>
+        <p:nvSpPr>
+          <p:cNvPr id="2" name="Marcador de imagen de diapositiva 1"/>
+          <p:cNvSpPr>
+            <a:spLocks noGrp="1" noRot="1" noChangeAspect="1"/>
+          </p:cNvSpPr>
+          <p:nvPr>
+            <p:ph type="sldImg"/>
+          </p:nvPr>
+        </p:nvSpPr>
+        <p:spPr/>
+      </p:sp>
+      <p:sp>
+        <p:nvSpPr>
+          <p:cNvPr id="3" name="Marcador de notas 2"/>
+          <p:cNvSpPr>
+            <a:spLocks noGrp="1"/>
+          </p:cNvSpPr>
+          <p:nvPr>
+            <p:ph type="body" idx="1"/>
+          </p:nvPr>
+        </p:nvSpPr>
+        <p:spPr/>
+        <p:txBody>
+          <a:bodyPr/>
+          <a:lstStyle/>
+          <a:p>
+            <a:endParaRPr lang="es-CO" dirty="0"/>
+          </a:p>
+        </p:txBody>
+      </p:sp>
+      <p:sp>
+        <p:nvSpPr>
+          <p:cNvPr id="4" name="Marcador de número de diapositiva 3"/>
+          <p:cNvSpPr>
+            <a:spLocks noGrp="1"/>
+          </p:cNvSpPr>
+          <p:nvPr>
             <p:ph type="sldNum" sz="quarter" idx="10"/>
           </p:nvPr>
         </p:nvSpPr>
@@ -741,7 +825,7 @@
           <a:p>
             <a:fld id="{B3030C24-9424-B24A-8613-79990C3AA492}" type="datetimeFigureOut">
               <a:rPr lang="es-ES" smtClean="0"/>
-              <a:t>28/11/2021</a:t>
+              <a:t>03/12/2021</a:t>
             </a:fld>
             <a:endParaRPr lang="es-ES"/>
           </a:p>
@@ -921,7 +1005,7 @@
           <a:p>
             <a:fld id="{B3030C24-9424-B24A-8613-79990C3AA492}" type="datetimeFigureOut">
               <a:rPr lang="es-ES" smtClean="0"/>
-              <a:t>28/11/2021</a:t>
+              <a:t>03/12/2021</a:t>
             </a:fld>
             <a:endParaRPr lang="es-ES"/>
           </a:p>
@@ -1558,7 +1642,7 @@
           <a:p>
             <a:fld id="{B3030C24-9424-B24A-8613-79990C3AA492}" type="datetimeFigureOut">
               <a:rPr lang="es-ES" smtClean="0"/>
-              <a:t>28/11/2021</a:t>
+              <a:t>03/12/2021</a:t>
             </a:fld>
             <a:endParaRPr lang="es-ES"/>
           </a:p>
@@ -1811,7 +1895,7 @@
           <a:p>
             <a:fld id="{B3030C24-9424-B24A-8613-79990C3AA492}" type="datetimeFigureOut">
               <a:rPr lang="es-ES" smtClean="0"/>
-              <a:t>28/11/2021</a:t>
+              <a:t>03/12/2021</a:t>
             </a:fld>
             <a:endParaRPr lang="es-ES"/>
           </a:p>
@@ -2024,7 +2108,7 @@
           <a:p>
             <a:fld id="{B3030C24-9424-B24A-8613-79990C3AA492}" type="datetimeFigureOut">
               <a:rPr lang="es-ES" smtClean="0"/>
-              <a:t>28/11/2021</a:t>
+              <a:t>03/12/2021</a:t>
             </a:fld>
             <a:endParaRPr lang="es-ES"/>
           </a:p>
@@ -2538,7 +2622,7 @@
                   </a:schemeClr>
                 </a:solidFill>
               </a:rPr>
-              <a:t>Guzman Gutierrez Santiago</a:t>
+              <a:t>Robayo Duran Juan Camilo</a:t>
             </a:r>
           </a:p>
           <a:p>
@@ -2572,7 +2656,7 @@
           <p:nvPr/>
         </p:nvPicPr>
         <p:blipFill rotWithShape="1">
-          <a:blip r:embed="rId2"/>
+          <a:blip r:embed="rId3"/>
           <a:srcRect t="24808" b="27638"/>
           <a:stretch/>
         </p:blipFill>

</xml_diff>

<commit_message>
Correcciónes realizadas por el profesor en diapositvias y diagramas de proceso
</commit_message>
<xml_diff>
--- a/app/app_documentacion/1er_trim/1_1_1_presentacion_proyecto.pptx
+++ b/app/app_documentacion/1er_trim/1_1_1_presentacion_proyecto.pptx
@@ -5,7 +5,7 @@
     <p:sldMasterId id="2147483648" r:id="rId1"/>
   </p:sldMasterIdLst>
   <p:notesMasterIdLst>
-    <p:notesMasterId r:id="rId16"/>
+    <p:notesMasterId r:id="rId19"/>
   </p:notesMasterIdLst>
   <p:sldIdLst>
     <p:sldId id="257" r:id="rId2"/>
@@ -13,15 +13,18 @@
     <p:sldId id="270" r:id="rId4"/>
     <p:sldId id="258" r:id="rId5"/>
     <p:sldId id="269" r:id="rId6"/>
-    <p:sldId id="271" r:id="rId7"/>
-    <p:sldId id="272" r:id="rId8"/>
-    <p:sldId id="273" r:id="rId9"/>
-    <p:sldId id="274" r:id="rId10"/>
-    <p:sldId id="275" r:id="rId11"/>
-    <p:sldId id="276" r:id="rId12"/>
-    <p:sldId id="267" r:id="rId13"/>
-    <p:sldId id="277" r:id="rId14"/>
-    <p:sldId id="262" r:id="rId15"/>
+    <p:sldId id="278" r:id="rId7"/>
+    <p:sldId id="271" r:id="rId8"/>
+    <p:sldId id="272" r:id="rId9"/>
+    <p:sldId id="273" r:id="rId10"/>
+    <p:sldId id="274" r:id="rId11"/>
+    <p:sldId id="279" r:id="rId12"/>
+    <p:sldId id="275" r:id="rId13"/>
+    <p:sldId id="276" r:id="rId14"/>
+    <p:sldId id="280" r:id="rId15"/>
+    <p:sldId id="277" r:id="rId16"/>
+    <p:sldId id="267" r:id="rId17"/>
+    <p:sldId id="262" r:id="rId18"/>
   </p:sldIdLst>
   <p:sldSz cx="9144000" cy="5143500" type="screen16x9"/>
   <p:notesSz cx="6858000" cy="9144000"/>
@@ -221,7 +224,7 @@
           <a:p>
             <a:fld id="{7E6DFAF8-F7BA-48F4-B956-3CC1A9ACF6C9}" type="datetimeFigureOut">
               <a:rPr lang="es-CO" smtClean="0"/>
-              <a:t>9/12/2021</a:t>
+              <a:t>10/12/2021</a:t>
             </a:fld>
             <a:endParaRPr lang="es-CO"/>
           </a:p>
@@ -638,7 +641,7 @@
           <a:p>
             <a:fld id="{7379F110-F3B2-4F4E-B872-D426D1629FD8}" type="slidenum">
               <a:rPr lang="es-CO" smtClean="0"/>
-              <a:t>9</a:t>
+              <a:t>4</a:t>
             </a:fld>
             <a:endParaRPr lang="es-CO"/>
           </a:p>
@@ -647,7 +650,7 @@
     </p:spTree>
     <p:extLst>
       <p:ext uri="{BB962C8B-B14F-4D97-AF65-F5344CB8AC3E}">
-        <p14:creationId xmlns:p14="http://schemas.microsoft.com/office/powerpoint/2010/main" val="4279128553"/>
+        <p14:creationId xmlns:p14="http://schemas.microsoft.com/office/powerpoint/2010/main" val="1384551564"/>
       </p:ext>
     </p:extLst>
   </p:cSld>
@@ -712,7 +715,7 @@
             <a:spLocks noGrp="1"/>
           </p:cNvSpPr>
           <p:nvPr>
-            <p:ph type="sldNum" sz="quarter" idx="10"/>
+            <p:ph type="sldNum" sz="quarter" idx="5"/>
           </p:nvPr>
         </p:nvSpPr>
         <p:spPr/>
@@ -722,7 +725,7 @@
           <a:p>
             <a:fld id="{7379F110-F3B2-4F4E-B872-D426D1629FD8}" type="slidenum">
               <a:rPr lang="es-CO" smtClean="0"/>
-              <a:t>12</a:t>
+              <a:t>10</a:t>
             </a:fld>
             <a:endParaRPr lang="es-CO"/>
           </a:p>
@@ -731,7 +734,7 @@
     </p:spTree>
     <p:extLst>
       <p:ext uri="{BB962C8B-B14F-4D97-AF65-F5344CB8AC3E}">
-        <p14:creationId xmlns:p14="http://schemas.microsoft.com/office/powerpoint/2010/main" val="203828818"/>
+        <p14:creationId xmlns:p14="http://schemas.microsoft.com/office/powerpoint/2010/main" val="4279128553"/>
       </p:ext>
     </p:extLst>
   </p:cSld>
@@ -796,6 +799,90 @@
             <a:spLocks noGrp="1"/>
           </p:cNvSpPr>
           <p:nvPr>
+            <p:ph type="sldNum" sz="quarter" idx="5"/>
+          </p:nvPr>
+        </p:nvSpPr>
+        <p:spPr/>
+        <p:txBody>
+          <a:bodyPr/>
+          <a:lstStyle/>
+          <a:p>
+            <a:fld id="{7379F110-F3B2-4F4E-B872-D426D1629FD8}" type="slidenum">
+              <a:rPr lang="es-CO" smtClean="0"/>
+              <a:t>11</a:t>
+            </a:fld>
+            <a:endParaRPr lang="es-CO"/>
+          </a:p>
+        </p:txBody>
+      </p:sp>
+    </p:spTree>
+    <p:extLst>
+      <p:ext uri="{BB962C8B-B14F-4D97-AF65-F5344CB8AC3E}">
+        <p14:creationId xmlns:p14="http://schemas.microsoft.com/office/powerpoint/2010/main" val="4054291245"/>
+      </p:ext>
+    </p:extLst>
+  </p:cSld>
+  <p:clrMapOvr>
+    <a:masterClrMapping/>
+  </p:clrMapOvr>
+</p:notes>
+</file>
+
+<file path=ppt/notesSlides/notesSlide5.xml><?xml version="1.0" encoding="utf-8"?>
+<p:notes xmlns:a="http://schemas.openxmlformats.org/drawingml/2006/main" xmlns:r="http://schemas.openxmlformats.org/officeDocument/2006/relationships" xmlns:p="http://schemas.openxmlformats.org/presentationml/2006/main">
+  <p:cSld>
+    <p:spTree>
+      <p:nvGrpSpPr>
+        <p:cNvPr id="1" name=""/>
+        <p:cNvGrpSpPr/>
+        <p:nvPr/>
+      </p:nvGrpSpPr>
+      <p:grpSpPr>
+        <a:xfrm>
+          <a:off x="0" y="0"/>
+          <a:ext cx="0" cy="0"/>
+          <a:chOff x="0" y="0"/>
+          <a:chExt cx="0" cy="0"/>
+        </a:xfrm>
+      </p:grpSpPr>
+      <p:sp>
+        <p:nvSpPr>
+          <p:cNvPr id="2" name="Marcador de imagen de diapositiva 1"/>
+          <p:cNvSpPr>
+            <a:spLocks noGrp="1" noRot="1" noChangeAspect="1"/>
+          </p:cNvSpPr>
+          <p:nvPr>
+            <p:ph type="sldImg"/>
+          </p:nvPr>
+        </p:nvSpPr>
+        <p:spPr/>
+      </p:sp>
+      <p:sp>
+        <p:nvSpPr>
+          <p:cNvPr id="3" name="Marcador de notas 2"/>
+          <p:cNvSpPr>
+            <a:spLocks noGrp="1"/>
+          </p:cNvSpPr>
+          <p:nvPr>
+            <p:ph type="body" idx="1"/>
+          </p:nvPr>
+        </p:nvSpPr>
+        <p:spPr/>
+        <p:txBody>
+          <a:bodyPr/>
+          <a:lstStyle/>
+          <a:p>
+            <a:endParaRPr lang="es-CO" dirty="0"/>
+          </a:p>
+        </p:txBody>
+      </p:sp>
+      <p:sp>
+        <p:nvSpPr>
+          <p:cNvPr id="4" name="Marcador de número de diapositiva 3"/>
+          <p:cNvSpPr>
+            <a:spLocks noGrp="1"/>
+          </p:cNvSpPr>
+          <p:nvPr>
             <p:ph type="sldNum" sz="quarter" idx="10"/>
           </p:nvPr>
         </p:nvSpPr>
@@ -806,7 +893,7 @@
           <a:p>
             <a:fld id="{7379F110-F3B2-4F4E-B872-D426D1629FD8}" type="slidenum">
               <a:rPr lang="es-CO" smtClean="0"/>
-              <a:t>13</a:t>
+              <a:t>15</a:t>
             </a:fld>
             <a:endParaRPr lang="es-CO"/>
           </a:p>
@@ -816,6 +903,90 @@
     <p:extLst>
       <p:ext uri="{BB962C8B-B14F-4D97-AF65-F5344CB8AC3E}">
         <p14:creationId xmlns:p14="http://schemas.microsoft.com/office/powerpoint/2010/main" val="336325514"/>
+      </p:ext>
+    </p:extLst>
+  </p:cSld>
+  <p:clrMapOvr>
+    <a:masterClrMapping/>
+  </p:clrMapOvr>
+</p:notes>
+</file>
+
+<file path=ppt/notesSlides/notesSlide6.xml><?xml version="1.0" encoding="utf-8"?>
+<p:notes xmlns:a="http://schemas.openxmlformats.org/drawingml/2006/main" xmlns:r="http://schemas.openxmlformats.org/officeDocument/2006/relationships" xmlns:p="http://schemas.openxmlformats.org/presentationml/2006/main">
+  <p:cSld>
+    <p:spTree>
+      <p:nvGrpSpPr>
+        <p:cNvPr id="1" name=""/>
+        <p:cNvGrpSpPr/>
+        <p:nvPr/>
+      </p:nvGrpSpPr>
+      <p:grpSpPr>
+        <a:xfrm>
+          <a:off x="0" y="0"/>
+          <a:ext cx="0" cy="0"/>
+          <a:chOff x="0" y="0"/>
+          <a:chExt cx="0" cy="0"/>
+        </a:xfrm>
+      </p:grpSpPr>
+      <p:sp>
+        <p:nvSpPr>
+          <p:cNvPr id="2" name="Marcador de imagen de diapositiva 1"/>
+          <p:cNvSpPr>
+            <a:spLocks noGrp="1" noRot="1" noChangeAspect="1"/>
+          </p:cNvSpPr>
+          <p:nvPr>
+            <p:ph type="sldImg"/>
+          </p:nvPr>
+        </p:nvSpPr>
+        <p:spPr/>
+      </p:sp>
+      <p:sp>
+        <p:nvSpPr>
+          <p:cNvPr id="3" name="Marcador de notas 2"/>
+          <p:cNvSpPr>
+            <a:spLocks noGrp="1"/>
+          </p:cNvSpPr>
+          <p:nvPr>
+            <p:ph type="body" idx="1"/>
+          </p:nvPr>
+        </p:nvSpPr>
+        <p:spPr/>
+        <p:txBody>
+          <a:bodyPr/>
+          <a:lstStyle/>
+          <a:p>
+            <a:endParaRPr lang="es-CO" dirty="0"/>
+          </a:p>
+        </p:txBody>
+      </p:sp>
+      <p:sp>
+        <p:nvSpPr>
+          <p:cNvPr id="4" name="Marcador de número de diapositiva 3"/>
+          <p:cNvSpPr>
+            <a:spLocks noGrp="1"/>
+          </p:cNvSpPr>
+          <p:nvPr>
+            <p:ph type="sldNum" sz="quarter" idx="10"/>
+          </p:nvPr>
+        </p:nvSpPr>
+        <p:spPr/>
+        <p:txBody>
+          <a:bodyPr/>
+          <a:lstStyle/>
+          <a:p>
+            <a:fld id="{7379F110-F3B2-4F4E-B872-D426D1629FD8}" type="slidenum">
+              <a:rPr lang="es-CO" smtClean="0"/>
+              <a:t>16</a:t>
+            </a:fld>
+            <a:endParaRPr lang="es-CO"/>
+          </a:p>
+        </p:txBody>
+      </p:sp>
+    </p:spTree>
+    <p:extLst>
+      <p:ext uri="{BB962C8B-B14F-4D97-AF65-F5344CB8AC3E}">
+        <p14:creationId xmlns:p14="http://schemas.microsoft.com/office/powerpoint/2010/main" val="203828818"/>
       </p:ext>
     </p:extLst>
   </p:cSld>
@@ -994,7 +1165,7 @@
           <a:p>
             <a:fld id="{B3030C24-9424-B24A-8613-79990C3AA492}" type="datetimeFigureOut">
               <a:rPr lang="es-ES" smtClean="0"/>
-              <a:t>09/12/2021</a:t>
+              <a:t>10/12/2021</a:t>
             </a:fld>
             <a:endParaRPr lang="es-ES"/>
           </a:p>
@@ -1174,7 +1345,7 @@
           <a:p>
             <a:fld id="{B3030C24-9424-B24A-8613-79990C3AA492}" type="datetimeFigureOut">
               <a:rPr lang="es-ES" smtClean="0"/>
-              <a:t>09/12/2021</a:t>
+              <a:t>10/12/2021</a:t>
             </a:fld>
             <a:endParaRPr lang="es-ES"/>
           </a:p>
@@ -1811,7 +1982,7 @@
           <a:p>
             <a:fld id="{B3030C24-9424-B24A-8613-79990C3AA492}" type="datetimeFigureOut">
               <a:rPr lang="es-ES" smtClean="0"/>
-              <a:t>09/12/2021</a:t>
+              <a:t>10/12/2021</a:t>
             </a:fld>
             <a:endParaRPr lang="es-ES"/>
           </a:p>
@@ -2064,7 +2235,7 @@
           <a:p>
             <a:fld id="{B3030C24-9424-B24A-8613-79990C3AA492}" type="datetimeFigureOut">
               <a:rPr lang="es-ES" smtClean="0"/>
-              <a:t>09/12/2021</a:t>
+              <a:t>10/12/2021</a:t>
             </a:fld>
             <a:endParaRPr lang="es-ES"/>
           </a:p>
@@ -2277,7 +2448,7 @@
           <a:p>
             <a:fld id="{B3030C24-9424-B24A-8613-79990C3AA492}" type="datetimeFigureOut">
               <a:rPr lang="es-ES" smtClean="0"/>
-              <a:t>09/12/2021</a:t>
+              <a:t>10/12/2021</a:t>
             </a:fld>
             <a:endParaRPr lang="es-ES"/>
           </a:p>
@@ -2869,6 +3040,606 @@
           <a:chExt cx="0" cy="0"/>
         </a:xfrm>
       </p:grpSpPr>
+      <p:sp>
+        <p:nvSpPr>
+          <p:cNvPr id="2" name="CuadroTexto 1"/>
+          <p:cNvSpPr txBox="1"/>
+          <p:nvPr/>
+        </p:nvSpPr>
+        <p:spPr>
+          <a:xfrm>
+            <a:off x="382868" y="249495"/>
+            <a:ext cx="2817532" cy="646331"/>
+          </a:xfrm>
+          <a:prstGeom prst="rect">
+            <a:avLst/>
+          </a:prstGeom>
+          <a:noFill/>
+        </p:spPr>
+        <p:txBody>
+          <a:bodyPr wrap="square" rtlCol="0">
+            <a:spAutoFit/>
+          </a:bodyPr>
+          <a:lstStyle/>
+          <a:p>
+            <a:r>
+              <a:rPr lang="es-ES" sz="3600" b="1" dirty="0">
+                <a:solidFill>
+                  <a:schemeClr val="bg1"/>
+                </a:solidFill>
+              </a:rPr>
+              <a:t>Justificación</a:t>
+            </a:r>
+          </a:p>
+        </p:txBody>
+      </p:sp>
+      <p:sp>
+        <p:nvSpPr>
+          <p:cNvPr id="8" name="Rectángulo 7"/>
+          <p:cNvSpPr/>
+          <p:nvPr/>
+        </p:nvSpPr>
+        <p:spPr>
+          <a:xfrm>
+            <a:off x="382868" y="1232954"/>
+            <a:ext cx="8308126" cy="3493264"/>
+          </a:xfrm>
+          <a:prstGeom prst="rect">
+            <a:avLst/>
+          </a:prstGeom>
+        </p:spPr>
+        <p:txBody>
+          <a:bodyPr wrap="square">
+            <a:spAutoFit/>
+          </a:bodyPr>
+          <a:lstStyle/>
+          <a:p>
+            <a:pPr algn="just"/>
+            <a:r>
+              <a:rPr lang="es-ES" sz="1600" dirty="0">
+                <a:solidFill>
+                  <a:schemeClr val="tx1">
+                    <a:lumMod val="75000"/>
+                    <a:lumOff val="25000"/>
+                  </a:schemeClr>
+                </a:solidFill>
+              </a:rPr>
+              <a:t>	Se propone el desarrollo de un Sistema de Información Web denominado CI Cash </a:t>
+            </a:r>
+            <a:r>
+              <a:rPr lang="es-ES" sz="1600" dirty="0" err="1">
+                <a:solidFill>
+                  <a:schemeClr val="tx1">
+                    <a:lumMod val="75000"/>
+                    <a:lumOff val="25000"/>
+                  </a:schemeClr>
+                </a:solidFill>
+              </a:rPr>
+              <a:t>Inventory</a:t>
+            </a:r>
+            <a:r>
+              <a:rPr lang="es-ES" sz="1600" dirty="0">
+                <a:solidFill>
+                  <a:schemeClr val="tx1">
+                    <a:lumMod val="75000"/>
+                    <a:lumOff val="25000"/>
+                  </a:schemeClr>
+                </a:solidFill>
+              </a:rPr>
+              <a:t> que sirva como herramienta software de apoyo al seguimiento y optimización de los procesos de venta e inventariado de la Empresa el Águila.</a:t>
+            </a:r>
+          </a:p>
+          <a:p>
+            <a:pPr algn="just"/>
+            <a:endParaRPr lang="es-ES" sz="1600" dirty="0">
+              <a:solidFill>
+                <a:schemeClr val="tx1">
+                  <a:lumMod val="75000"/>
+                  <a:lumOff val="25000"/>
+                </a:schemeClr>
+              </a:solidFill>
+            </a:endParaRPr>
+          </a:p>
+          <a:p>
+            <a:pPr algn="just"/>
+            <a:r>
+              <a:rPr lang="es-ES" sz="1600" dirty="0">
+                <a:solidFill>
+                  <a:schemeClr val="tx1">
+                    <a:lumMod val="75000"/>
+                    <a:lumOff val="25000"/>
+                  </a:schemeClr>
+                </a:solidFill>
+              </a:rPr>
+              <a:t>	CI Cash </a:t>
+            </a:r>
+            <a:r>
+              <a:rPr lang="es-ES" sz="1600" dirty="0" err="1">
+                <a:solidFill>
+                  <a:schemeClr val="tx1">
+                    <a:lumMod val="75000"/>
+                    <a:lumOff val="25000"/>
+                  </a:schemeClr>
+                </a:solidFill>
+              </a:rPr>
+              <a:t>Inventory</a:t>
+            </a:r>
+            <a:r>
+              <a:rPr lang="es-ES" sz="1600" dirty="0">
+                <a:solidFill>
+                  <a:schemeClr val="tx1">
+                    <a:lumMod val="75000"/>
+                    <a:lumOff val="25000"/>
+                  </a:schemeClr>
+                </a:solidFill>
+              </a:rPr>
+              <a:t> permitirá la gestión de los vendedores, de Bodega y del administrador como usuarios de la Empresa el Águila. </a:t>
+            </a:r>
+          </a:p>
+          <a:p>
+            <a:pPr algn="just"/>
+            <a:endParaRPr lang="es-ES" sz="1600" dirty="0">
+              <a:solidFill>
+                <a:schemeClr val="tx1">
+                  <a:lumMod val="75000"/>
+                  <a:lumOff val="25000"/>
+                </a:schemeClr>
+              </a:solidFill>
+            </a:endParaRPr>
+          </a:p>
+          <a:p>
+            <a:pPr algn="just"/>
+            <a:r>
+              <a:rPr lang="es-ES" sz="1600" dirty="0">
+                <a:solidFill>
+                  <a:schemeClr val="tx1">
+                    <a:lumMod val="75000"/>
+                    <a:lumOff val="25000"/>
+                  </a:schemeClr>
+                </a:solidFill>
+              </a:rPr>
+              <a:t>	En el proceso de venta los vendedores podrán consultar el precio del producto por medio de código de barras, existencias del mismo en tienda y bodega, generar factura de venta y descontar del inventario el elemento vendido, de esta forma se reducen tiempos en el proceso de venta, se lleva un control de productos vendidos y se mantiene el stock de elementos actualizado.</a:t>
+            </a:r>
+          </a:p>
+          <a:p>
+            <a:pPr algn="just"/>
+            <a:endParaRPr lang="es-ES" sz="1500" dirty="0">
+              <a:solidFill>
+                <a:schemeClr val="tx1">
+                  <a:lumMod val="75000"/>
+                  <a:lumOff val="25000"/>
+                </a:schemeClr>
+              </a:solidFill>
+            </a:endParaRPr>
+          </a:p>
+          <a:p>
+            <a:pPr algn="just"/>
+            <a:r>
+              <a:rPr lang="es-ES" sz="1500" dirty="0">
+                <a:solidFill>
+                  <a:schemeClr val="tx1">
+                    <a:lumMod val="75000"/>
+                    <a:lumOff val="25000"/>
+                  </a:schemeClr>
+                </a:solidFill>
+              </a:rPr>
+              <a:t>	</a:t>
+            </a:r>
+          </a:p>
+          <a:p>
+            <a:pPr algn="just"/>
+            <a:r>
+              <a:rPr lang="es-ES" sz="1500" dirty="0">
+                <a:solidFill>
+                  <a:schemeClr val="tx1">
+                    <a:lumMod val="75000"/>
+                    <a:lumOff val="25000"/>
+                  </a:schemeClr>
+                </a:solidFill>
+              </a:rPr>
+              <a:t>	</a:t>
+            </a:r>
+            <a:endParaRPr lang="es-ES_tradnl" sz="1600" dirty="0">
+              <a:solidFill>
+                <a:schemeClr val="tx1">
+                  <a:lumMod val="75000"/>
+                  <a:lumOff val="25000"/>
+                </a:schemeClr>
+              </a:solidFill>
+            </a:endParaRPr>
+          </a:p>
+        </p:txBody>
+      </p:sp>
+      <p:sp>
+        <p:nvSpPr>
+          <p:cNvPr id="9" name="Rectángulo 8">
+            <a:hlinkClick r:id="rId3" action="ppaction://hlinksldjump"/>
+          </p:cNvPr>
+          <p:cNvSpPr/>
+          <p:nvPr/>
+        </p:nvSpPr>
+        <p:spPr>
+          <a:xfrm>
+            <a:off x="8212822" y="192947"/>
+            <a:ext cx="746620" cy="679508"/>
+          </a:xfrm>
+          <a:prstGeom prst="rect">
+            <a:avLst/>
+          </a:prstGeom>
+          <a:noFill/>
+          <a:ln>
+            <a:noFill/>
+          </a:ln>
+        </p:spPr>
+        <p:style>
+          <a:lnRef idx="1">
+            <a:schemeClr val="accent1"/>
+          </a:lnRef>
+          <a:fillRef idx="3">
+            <a:schemeClr val="accent1"/>
+          </a:fillRef>
+          <a:effectRef idx="2">
+            <a:schemeClr val="accent1"/>
+          </a:effectRef>
+          <a:fontRef idx="minor">
+            <a:schemeClr val="lt1"/>
+          </a:fontRef>
+        </p:style>
+        <p:txBody>
+          <a:bodyPr rtlCol="0" anchor="ctr"/>
+          <a:lstStyle/>
+          <a:p>
+            <a:pPr algn="ctr"/>
+            <a:endParaRPr lang="es-CO"/>
+          </a:p>
+        </p:txBody>
+      </p:sp>
+      <p:pic>
+        <p:nvPicPr>
+          <p:cNvPr id="7" name="Imagen 6">
+            <a:extLst>
+              <a:ext uri="{FF2B5EF4-FFF2-40B4-BE49-F238E27FC236}">
+                <a16:creationId xmlns:a16="http://schemas.microsoft.com/office/drawing/2014/main" id="{5D771AA1-6376-4BF2-BF7D-083F4509AE6C}"/>
+              </a:ext>
+            </a:extLst>
+          </p:cNvPr>
+          <p:cNvPicPr>
+            <a:picLocks noChangeAspect="1"/>
+          </p:cNvPicPr>
+          <p:nvPr/>
+        </p:nvPicPr>
+        <p:blipFill>
+          <a:blip r:embed="rId4"/>
+          <a:stretch>
+            <a:fillRect/>
+          </a:stretch>
+        </p:blipFill>
+        <p:spPr>
+          <a:xfrm>
+            <a:off x="7966247" y="4031382"/>
+            <a:ext cx="1007830" cy="1007830"/>
+          </a:xfrm>
+          <a:prstGeom prst="rect">
+            <a:avLst/>
+          </a:prstGeom>
+        </p:spPr>
+      </p:pic>
+    </p:spTree>
+    <p:extLst>
+      <p:ext uri="{BB962C8B-B14F-4D97-AF65-F5344CB8AC3E}">
+        <p14:creationId xmlns:p14="http://schemas.microsoft.com/office/powerpoint/2010/main" val="4272611872"/>
+      </p:ext>
+    </p:extLst>
+  </p:cSld>
+  <p:clrMapOvr>
+    <a:masterClrMapping/>
+  </p:clrMapOvr>
+</p:sld>
+</file>
+
+<file path=ppt/slides/slide11.xml><?xml version="1.0" encoding="utf-8"?>
+<p:sld xmlns:a="http://schemas.openxmlformats.org/drawingml/2006/main" xmlns:r="http://schemas.openxmlformats.org/officeDocument/2006/relationships" xmlns:p="http://schemas.openxmlformats.org/presentationml/2006/main">
+  <p:cSld>
+    <p:spTree>
+      <p:nvGrpSpPr>
+        <p:cNvPr id="1" name=""/>
+        <p:cNvGrpSpPr/>
+        <p:nvPr/>
+      </p:nvGrpSpPr>
+      <p:grpSpPr>
+        <a:xfrm>
+          <a:off x="0" y="0"/>
+          <a:ext cx="0" cy="0"/>
+          <a:chOff x="0" y="0"/>
+          <a:chExt cx="0" cy="0"/>
+        </a:xfrm>
+      </p:grpSpPr>
+      <p:sp>
+        <p:nvSpPr>
+          <p:cNvPr id="2" name="CuadroTexto 1"/>
+          <p:cNvSpPr txBox="1"/>
+          <p:nvPr/>
+        </p:nvSpPr>
+        <p:spPr>
+          <a:xfrm>
+            <a:off x="382868" y="249495"/>
+            <a:ext cx="2817532" cy="646331"/>
+          </a:xfrm>
+          <a:prstGeom prst="rect">
+            <a:avLst/>
+          </a:prstGeom>
+          <a:noFill/>
+        </p:spPr>
+        <p:txBody>
+          <a:bodyPr wrap="square" rtlCol="0">
+            <a:spAutoFit/>
+          </a:bodyPr>
+          <a:lstStyle/>
+          <a:p>
+            <a:r>
+              <a:rPr lang="es-ES" sz="3600" b="1" dirty="0">
+                <a:solidFill>
+                  <a:schemeClr val="bg1"/>
+                </a:solidFill>
+              </a:rPr>
+              <a:t>Justificación</a:t>
+            </a:r>
+          </a:p>
+        </p:txBody>
+      </p:sp>
+      <p:sp>
+        <p:nvSpPr>
+          <p:cNvPr id="8" name="Rectángulo 7"/>
+          <p:cNvSpPr/>
+          <p:nvPr/>
+        </p:nvSpPr>
+        <p:spPr>
+          <a:xfrm>
+            <a:off x="382868" y="1338006"/>
+            <a:ext cx="8308126" cy="3277820"/>
+          </a:xfrm>
+          <a:prstGeom prst="rect">
+            <a:avLst/>
+          </a:prstGeom>
+        </p:spPr>
+        <p:txBody>
+          <a:bodyPr wrap="square">
+            <a:spAutoFit/>
+          </a:bodyPr>
+          <a:lstStyle/>
+          <a:p>
+            <a:pPr algn="just"/>
+            <a:r>
+              <a:rPr lang="es-ES" sz="1600" dirty="0">
+                <a:solidFill>
+                  <a:schemeClr val="tx1">
+                    <a:lumMod val="75000"/>
+                    <a:lumOff val="25000"/>
+                  </a:schemeClr>
+                </a:solidFill>
+              </a:rPr>
+              <a:t>	En el proceso de almacenado los usuarios con rol de bodega podrán ingresar productos al inventario, consultar el stock de los diferentes elementos, cambiar ubicación de los productos en la base de datos (de bodega a tienda), por consiguiente se digitaliza el inventario de productos y se sabe en que momento se debe realizar reabastecimiento, y se tiene conocimiento de existencias de un elemento.</a:t>
+            </a:r>
+          </a:p>
+          <a:p>
+            <a:pPr algn="just"/>
+            <a:endParaRPr lang="es-ES" sz="1600" dirty="0">
+              <a:solidFill>
+                <a:schemeClr val="tx1">
+                  <a:lumMod val="75000"/>
+                  <a:lumOff val="25000"/>
+                </a:schemeClr>
+              </a:solidFill>
+            </a:endParaRPr>
+          </a:p>
+          <a:p>
+            <a:pPr algn="just"/>
+            <a:r>
+              <a:rPr lang="es-ES" sz="1600" dirty="0">
+                <a:solidFill>
+                  <a:schemeClr val="tx1">
+                    <a:lumMod val="75000"/>
+                    <a:lumOff val="25000"/>
+                  </a:schemeClr>
+                </a:solidFill>
+              </a:rPr>
+              <a:t>	El usuario con rol de administrador podrá crear usuarios, modificar roles y finalmente, facilitará la gestión de reportes gráficos e impresos, necesarios para la toma de decisiones comerciales y administrativas del gerente en la Empresa el Águila.</a:t>
+            </a:r>
+          </a:p>
+          <a:p>
+            <a:pPr algn="just"/>
+            <a:endParaRPr lang="es-ES" sz="1600" dirty="0">
+              <a:solidFill>
+                <a:schemeClr val="tx1">
+                  <a:lumMod val="75000"/>
+                  <a:lumOff val="25000"/>
+                </a:schemeClr>
+              </a:solidFill>
+            </a:endParaRPr>
+          </a:p>
+          <a:p>
+            <a:pPr algn="just"/>
+            <a:r>
+              <a:rPr lang="es-ES" sz="1600" dirty="0">
+                <a:solidFill>
+                  <a:schemeClr val="tx1">
+                    <a:lumMod val="75000"/>
+                    <a:lumOff val="25000"/>
+                  </a:schemeClr>
+                </a:solidFill>
+              </a:rPr>
+              <a:t>	El Sistema CI Cash </a:t>
+            </a:r>
+            <a:r>
+              <a:rPr lang="es-ES" sz="1600" dirty="0" err="1">
+                <a:solidFill>
+                  <a:schemeClr val="tx1">
+                    <a:lumMod val="75000"/>
+                    <a:lumOff val="25000"/>
+                  </a:schemeClr>
+                </a:solidFill>
+              </a:rPr>
+              <a:t>Inventory</a:t>
+            </a:r>
+            <a:r>
+              <a:rPr lang="es-ES" sz="1600" dirty="0">
+                <a:solidFill>
+                  <a:schemeClr val="tx1">
+                    <a:lumMod val="75000"/>
+                    <a:lumOff val="25000"/>
+                  </a:schemeClr>
+                </a:solidFill>
+              </a:rPr>
+              <a:t> servirá como aporte al sector comercial como </a:t>
+            </a:r>
+            <a:r>
+              <a:rPr lang="es-MX" sz="1600" dirty="0">
+                <a:solidFill>
+                  <a:schemeClr val="tx1">
+                    <a:lumMod val="75000"/>
+                    <a:lumOff val="25000"/>
+                  </a:schemeClr>
+                </a:solidFill>
+              </a:rPr>
+              <a:t>herramienta de apoyo para venta y control de almacenado de productos.</a:t>
+            </a:r>
+            <a:endParaRPr lang="es-ES" sz="1600" dirty="0">
+              <a:solidFill>
+                <a:schemeClr val="tx1">
+                  <a:lumMod val="75000"/>
+                  <a:lumOff val="25000"/>
+                </a:schemeClr>
+              </a:solidFill>
+            </a:endParaRPr>
+          </a:p>
+          <a:p>
+            <a:pPr algn="just"/>
+            <a:r>
+              <a:rPr lang="es-ES" sz="1500" dirty="0">
+                <a:solidFill>
+                  <a:schemeClr val="tx1">
+                    <a:lumMod val="75000"/>
+                    <a:lumOff val="25000"/>
+                  </a:schemeClr>
+                </a:solidFill>
+              </a:rPr>
+              <a:t>	</a:t>
+            </a:r>
+            <a:endParaRPr lang="es-ES_tradnl" sz="1600" dirty="0">
+              <a:solidFill>
+                <a:schemeClr val="tx1">
+                  <a:lumMod val="75000"/>
+                  <a:lumOff val="25000"/>
+                </a:schemeClr>
+              </a:solidFill>
+            </a:endParaRPr>
+          </a:p>
+        </p:txBody>
+      </p:sp>
+      <p:sp>
+        <p:nvSpPr>
+          <p:cNvPr id="9" name="Rectángulo 8">
+            <a:hlinkClick r:id="rId3" action="ppaction://hlinksldjump"/>
+          </p:cNvPr>
+          <p:cNvSpPr/>
+          <p:nvPr/>
+        </p:nvSpPr>
+        <p:spPr>
+          <a:xfrm>
+            <a:off x="8212822" y="192947"/>
+            <a:ext cx="746620" cy="679508"/>
+          </a:xfrm>
+          <a:prstGeom prst="rect">
+            <a:avLst/>
+          </a:prstGeom>
+          <a:noFill/>
+          <a:ln>
+            <a:noFill/>
+          </a:ln>
+        </p:spPr>
+        <p:style>
+          <a:lnRef idx="1">
+            <a:schemeClr val="accent1"/>
+          </a:lnRef>
+          <a:fillRef idx="3">
+            <a:schemeClr val="accent1"/>
+          </a:fillRef>
+          <a:effectRef idx="2">
+            <a:schemeClr val="accent1"/>
+          </a:effectRef>
+          <a:fontRef idx="minor">
+            <a:schemeClr val="lt1"/>
+          </a:fontRef>
+        </p:style>
+        <p:txBody>
+          <a:bodyPr rtlCol="0" anchor="ctr"/>
+          <a:lstStyle/>
+          <a:p>
+            <a:pPr algn="ctr"/>
+            <a:endParaRPr lang="es-CO"/>
+          </a:p>
+        </p:txBody>
+      </p:sp>
+      <p:pic>
+        <p:nvPicPr>
+          <p:cNvPr id="7" name="Imagen 6">
+            <a:extLst>
+              <a:ext uri="{FF2B5EF4-FFF2-40B4-BE49-F238E27FC236}">
+                <a16:creationId xmlns:a16="http://schemas.microsoft.com/office/drawing/2014/main" id="{5D771AA1-6376-4BF2-BF7D-083F4509AE6C}"/>
+              </a:ext>
+            </a:extLst>
+          </p:cNvPr>
+          <p:cNvPicPr>
+            <a:picLocks noChangeAspect="1"/>
+          </p:cNvPicPr>
+          <p:nvPr/>
+        </p:nvPicPr>
+        <p:blipFill>
+          <a:blip r:embed="rId4"/>
+          <a:stretch>
+            <a:fillRect/>
+          </a:stretch>
+        </p:blipFill>
+        <p:spPr>
+          <a:xfrm>
+            <a:off x="7966247" y="4031382"/>
+            <a:ext cx="1007830" cy="1007830"/>
+          </a:xfrm>
+          <a:prstGeom prst="rect">
+            <a:avLst/>
+          </a:prstGeom>
+        </p:spPr>
+      </p:pic>
+    </p:spTree>
+    <p:extLst>
+      <p:ext uri="{BB962C8B-B14F-4D97-AF65-F5344CB8AC3E}">
+        <p14:creationId xmlns:p14="http://schemas.microsoft.com/office/powerpoint/2010/main" val="3000933397"/>
+      </p:ext>
+    </p:extLst>
+  </p:cSld>
+  <p:clrMapOvr>
+    <a:masterClrMapping/>
+  </p:clrMapOvr>
+</p:sld>
+</file>
+
+<file path=ppt/slides/slide12.xml><?xml version="1.0" encoding="utf-8"?>
+<p:sld xmlns:a="http://schemas.openxmlformats.org/drawingml/2006/main" xmlns:r="http://schemas.openxmlformats.org/officeDocument/2006/relationships" xmlns:p="http://schemas.openxmlformats.org/presentationml/2006/main">
+  <p:cSld>
+    <p:spTree>
+      <p:nvGrpSpPr>
+        <p:cNvPr id="1" name=""/>
+        <p:cNvGrpSpPr/>
+        <p:nvPr/>
+      </p:nvGrpSpPr>
+      <p:grpSpPr>
+        <a:xfrm>
+          <a:off x="0" y="0"/>
+          <a:ext cx="0" cy="0"/>
+          <a:chOff x="0" y="0"/>
+          <a:chExt cx="0" cy="0"/>
+        </a:xfrm>
+      </p:grpSpPr>
       <p:pic>
         <p:nvPicPr>
           <p:cNvPr id="5122" name="Picture 2" descr="https://media.istockphoto.com/photos/checking-barcodes-picture-id685855718?b=1&amp;k=20&amp;m=685855718&amp;s=170667a&amp;w=0&amp;h=fN4sjP6CuTqhwX9S-CtDoMAh98j-U6QyC631uEfzP3g=">
@@ -2922,7 +3693,7 @@
         </p:nvSpPr>
         <p:spPr>
           <a:xfrm>
-            <a:off x="4879629" y="296529"/>
+            <a:off x="4879629" y="848610"/>
             <a:ext cx="4377600" cy="923330"/>
           </a:xfrm>
           <a:prstGeom prst="rect">
@@ -2958,8 +3729,8 @@
         </p:nvSpPr>
         <p:spPr>
           <a:xfrm>
-            <a:off x="4879629" y="1567262"/>
-            <a:ext cx="3882234" cy="2585323"/>
+            <a:off x="4879629" y="2027799"/>
+            <a:ext cx="3882234" cy="1754326"/>
           </a:xfrm>
           <a:prstGeom prst="rect">
             <a:avLst/>
@@ -2972,6 +3743,7 @@
           </a:bodyPr>
           <a:lstStyle/>
           <a:p>
+            <a:pPr algn="just"/>
             <a:r>
               <a:rPr lang="es-ES" dirty="0">
                 <a:solidFill>
@@ -2981,7 +3753,29 @@
                   </a:schemeClr>
                 </a:solidFill>
               </a:rPr>
-              <a:t>El Sistema solamente se encarga de almacenar información y consultar esta en la base de datos, será una herramienta netamente de apoyo logístico y organizacional, la efectividad del mismo depende del correcto uso por parte de los diferentes roles, de la veracidad de la información suministrada al mismo.</a:t>
+              <a:t>En el siguiente apartado se describirá hasta donde se pretende llegar con CI Cash </a:t>
+            </a:r>
+            <a:r>
+              <a:rPr lang="es-ES" dirty="0" err="1">
+                <a:solidFill>
+                  <a:schemeClr val="tx1">
+                    <a:lumMod val="75000"/>
+                    <a:lumOff val="25000"/>
+                  </a:schemeClr>
+                </a:solidFill>
+              </a:rPr>
+              <a:t>Inventory</a:t>
+            </a:r>
+            <a:r>
+              <a:rPr lang="es-ES" dirty="0">
+                <a:solidFill>
+                  <a:schemeClr val="tx1">
+                    <a:lumMod val="75000"/>
+                    <a:lumOff val="25000"/>
+                  </a:schemeClr>
+                </a:solidFill>
+              </a:rPr>
+              <a:t>, los tiempos de desarrollo así como las herramientas a utilizar para la creación del aplicativo web</a:t>
             </a:r>
           </a:p>
         </p:txBody>
@@ -2994,7 +3788,7 @@
         </p:nvSpPr>
         <p:spPr>
           <a:xfrm>
-            <a:off x="4988750" y="1184196"/>
+            <a:off x="4988750" y="1778542"/>
             <a:ext cx="718487" cy="45719"/>
           </a:xfrm>
           <a:prstGeom prst="rect">
@@ -3109,609 +3903,6 @@
     <p:extLst>
       <p:ext uri="{BB962C8B-B14F-4D97-AF65-F5344CB8AC3E}">
         <p14:creationId xmlns:p14="http://schemas.microsoft.com/office/powerpoint/2010/main" val="1248321586"/>
-      </p:ext>
-    </p:extLst>
-  </p:cSld>
-  <p:clrMapOvr>
-    <a:masterClrMapping/>
-  </p:clrMapOvr>
-</p:sld>
-</file>
-
-<file path=ppt/slides/slide11.xml><?xml version="1.0" encoding="utf-8"?>
-<p:sld xmlns:a="http://schemas.openxmlformats.org/drawingml/2006/main" xmlns:r="http://schemas.openxmlformats.org/officeDocument/2006/relationships" xmlns:p="http://schemas.openxmlformats.org/presentationml/2006/main">
-  <p:cSld>
-    <p:spTree>
-      <p:nvGrpSpPr>
-        <p:cNvPr id="1" name=""/>
-        <p:cNvGrpSpPr/>
-        <p:nvPr/>
-      </p:nvGrpSpPr>
-      <p:grpSpPr>
-        <a:xfrm>
-          <a:off x="0" y="0"/>
-          <a:ext cx="0" cy="0"/>
-          <a:chOff x="0" y="0"/>
-          <a:chExt cx="0" cy="0"/>
-        </a:xfrm>
-      </p:grpSpPr>
-      <p:sp>
-        <p:nvSpPr>
-          <p:cNvPr id="2" name="CuadroTexto 1"/>
-          <p:cNvSpPr txBox="1"/>
-          <p:nvPr/>
-        </p:nvSpPr>
-        <p:spPr>
-          <a:xfrm>
-            <a:off x="382867" y="249495"/>
-            <a:ext cx="5413925" cy="646331"/>
-          </a:xfrm>
-          <a:prstGeom prst="rect">
-            <a:avLst/>
-          </a:prstGeom>
-          <a:noFill/>
-        </p:spPr>
-        <p:txBody>
-          <a:bodyPr wrap="square" rtlCol="0">
-            <a:spAutoFit/>
-          </a:bodyPr>
-          <a:lstStyle/>
-          <a:p>
-            <a:r>
-              <a:rPr lang="es-ES" sz="3600" b="1" dirty="0">
-                <a:solidFill>
-                  <a:schemeClr val="bg1"/>
-                </a:solidFill>
-              </a:rPr>
-              <a:t>Alcance</a:t>
-            </a:r>
-          </a:p>
-        </p:txBody>
-      </p:sp>
-      <p:sp>
-        <p:nvSpPr>
-          <p:cNvPr id="5" name="Rectángulo 4"/>
-          <p:cNvSpPr/>
-          <p:nvPr/>
-        </p:nvSpPr>
-        <p:spPr>
-          <a:xfrm>
-            <a:off x="382867" y="1232954"/>
-            <a:ext cx="8333294" cy="3293209"/>
-          </a:xfrm>
-          <a:prstGeom prst="rect">
-            <a:avLst/>
-          </a:prstGeom>
-        </p:spPr>
-        <p:txBody>
-          <a:bodyPr wrap="square">
-            <a:spAutoFit/>
-          </a:bodyPr>
-          <a:lstStyle/>
-          <a:p>
-            <a:r>
-              <a:rPr lang="es-ES" sz="1600" dirty="0">
-                <a:solidFill>
-                  <a:schemeClr val="tx1">
-                    <a:lumMod val="75000"/>
-                    <a:lumOff val="25000"/>
-                  </a:schemeClr>
-                </a:solidFill>
-              </a:rPr>
-              <a:t>En el proceso de venta los vendedores podrán consultar el precio del producto por medio de código de barras, existencias del mismo en tienda y bodega, generar factura de venta y descontar del inventario el elemento vendido, En el proceso de almacenado los usuarios con rol de bodega podrán ingresar productos al inventario, consultar el stock de los diferentes elementos, cambiar ubicación de los productos en la base de datos (de bodega a tienda), El usuario con rol de administrador podrá crear usuarios, modificar roles y finalmente, facilitará la gestión de reportes gráficos e impresos, necesarios para la toma de decisiones comerciales y administrativas del gerente en la Empresa el Águila </a:t>
-            </a:r>
-          </a:p>
-          <a:p>
-            <a:r>
-              <a:rPr lang="es-ES" sz="1600" dirty="0">
-                <a:solidFill>
-                  <a:schemeClr val="tx1">
-                    <a:lumMod val="75000"/>
-                    <a:lumOff val="25000"/>
-                  </a:schemeClr>
-                </a:solidFill>
-              </a:rPr>
-              <a:t>El sistema no permitirá cambios administrativos (Cambios de precios, de existencias y de historial de venta) si no es autorizado por el administrador, adicionalmente el sistema no establecerá comunicaciones entre roles ya que su objetivo fundamental es crear un método de consulta para organización y optimización en la venta y control de almacenado de productos.</a:t>
-            </a:r>
-          </a:p>
-          <a:p>
-            <a:r>
-              <a:rPr lang="es-ES" sz="1600" dirty="0">
-                <a:solidFill>
-                  <a:schemeClr val="tx1">
-                    <a:lumMod val="75000"/>
-                    <a:lumOff val="25000"/>
-                  </a:schemeClr>
-                </a:solidFill>
-              </a:rPr>
-              <a:t>Se creará un sistema de información en un sitio web con HTML, CSS, PHP Y SQL </a:t>
-            </a:r>
-          </a:p>
-        </p:txBody>
-      </p:sp>
-      <p:sp>
-        <p:nvSpPr>
-          <p:cNvPr id="14" name="Rectángulo 13">
-            <a:hlinkClick r:id="rId2" action="ppaction://hlinksldjump"/>
-          </p:cNvPr>
-          <p:cNvSpPr/>
-          <p:nvPr/>
-        </p:nvSpPr>
-        <p:spPr>
-          <a:xfrm>
-            <a:off x="8212822" y="192947"/>
-            <a:ext cx="746620" cy="679508"/>
-          </a:xfrm>
-          <a:prstGeom prst="rect">
-            <a:avLst/>
-          </a:prstGeom>
-          <a:noFill/>
-          <a:ln>
-            <a:noFill/>
-          </a:ln>
-        </p:spPr>
-        <p:style>
-          <a:lnRef idx="1">
-            <a:schemeClr val="accent1"/>
-          </a:lnRef>
-          <a:fillRef idx="3">
-            <a:schemeClr val="accent1"/>
-          </a:fillRef>
-          <a:effectRef idx="2">
-            <a:schemeClr val="accent1"/>
-          </a:effectRef>
-          <a:fontRef idx="minor">
-            <a:schemeClr val="lt1"/>
-          </a:fontRef>
-        </p:style>
-        <p:txBody>
-          <a:bodyPr rtlCol="0" anchor="ctr"/>
-          <a:lstStyle/>
-          <a:p>
-            <a:pPr algn="ctr"/>
-            <a:endParaRPr lang="es-CO"/>
-          </a:p>
-        </p:txBody>
-      </p:sp>
-      <p:pic>
-        <p:nvPicPr>
-          <p:cNvPr id="7" name="Imagen 6">
-            <a:extLst>
-              <a:ext uri="{FF2B5EF4-FFF2-40B4-BE49-F238E27FC236}">
-                <a16:creationId xmlns:a16="http://schemas.microsoft.com/office/drawing/2014/main" id="{0525457E-4782-41F4-B946-D2A9F21E6076}"/>
-              </a:ext>
-            </a:extLst>
-          </p:cNvPr>
-          <p:cNvPicPr>
-            <a:picLocks noChangeAspect="1"/>
-          </p:cNvPicPr>
-          <p:nvPr/>
-        </p:nvPicPr>
-        <p:blipFill>
-          <a:blip r:embed="rId3"/>
-          <a:stretch>
-            <a:fillRect/>
-          </a:stretch>
-        </p:blipFill>
-        <p:spPr>
-          <a:xfrm>
-            <a:off x="7966247" y="4031382"/>
-            <a:ext cx="1007830" cy="1007830"/>
-          </a:xfrm>
-          <a:prstGeom prst="rect">
-            <a:avLst/>
-          </a:prstGeom>
-        </p:spPr>
-      </p:pic>
-    </p:spTree>
-    <p:extLst>
-      <p:ext uri="{BB962C8B-B14F-4D97-AF65-F5344CB8AC3E}">
-        <p14:creationId xmlns:p14="http://schemas.microsoft.com/office/powerpoint/2010/main" val="364966841"/>
-      </p:ext>
-    </p:extLst>
-  </p:cSld>
-  <p:clrMapOvr>
-    <a:masterClrMapping/>
-  </p:clrMapOvr>
-</p:sld>
-</file>
-
-<file path=ppt/slides/slide12.xml><?xml version="1.0" encoding="utf-8"?>
-<p:sld xmlns:a="http://schemas.openxmlformats.org/drawingml/2006/main" xmlns:r="http://schemas.openxmlformats.org/officeDocument/2006/relationships" xmlns:p="http://schemas.openxmlformats.org/presentationml/2006/main">
-  <p:cSld>
-    <p:spTree>
-      <p:nvGrpSpPr>
-        <p:cNvPr id="1" name=""/>
-        <p:cNvGrpSpPr/>
-        <p:nvPr/>
-      </p:nvGrpSpPr>
-      <p:grpSpPr>
-        <a:xfrm>
-          <a:off x="0" y="0"/>
-          <a:ext cx="0" cy="0"/>
-          <a:chOff x="0" y="0"/>
-          <a:chExt cx="0" cy="0"/>
-        </a:xfrm>
-      </p:grpSpPr>
-      <p:sp>
-        <p:nvSpPr>
-          <p:cNvPr id="5" name="Rectángulo 4"/>
-          <p:cNvSpPr/>
-          <p:nvPr/>
-        </p:nvSpPr>
-        <p:spPr>
-          <a:xfrm>
-            <a:off x="2788196" y="1246526"/>
-            <a:ext cx="6834610" cy="2902974"/>
-          </a:xfrm>
-          <a:prstGeom prst="rect">
-            <a:avLst/>
-          </a:prstGeom>
-          <a:noFill/>
-        </p:spPr>
-        <p:txBody>
-          <a:bodyPr wrap="square" anchor="t" anchorCtr="0">
-            <a:spAutoFit/>
-          </a:bodyPr>
-          <a:lstStyle/>
-          <a:p>
-            <a:pPr>
-              <a:lnSpc>
-                <a:spcPct val="120000"/>
-              </a:lnSpc>
-            </a:pPr>
-            <a:r>
-              <a:rPr lang="es-ES_tradnl" sz="3600" b="1" dirty="0">
-                <a:solidFill>
-                  <a:schemeClr val="tx1">
-                    <a:lumMod val="75000"/>
-                    <a:lumOff val="25000"/>
-                  </a:schemeClr>
-                </a:solidFill>
-              </a:rPr>
-              <a:t>Primer Trimestre</a:t>
-            </a:r>
-          </a:p>
-          <a:p>
-            <a:pPr marL="444500" indent="-285750">
-              <a:buFont typeface="Arial" panose="020B0604020202020204" pitchFamily="34" charset="0"/>
-              <a:buChar char="•"/>
-            </a:pPr>
-            <a:r>
-              <a:rPr lang="es-ES" dirty="0">
-                <a:solidFill>
-                  <a:schemeClr val="tx1">
-                    <a:lumMod val="75000"/>
-                    <a:lumOff val="25000"/>
-                  </a:schemeClr>
-                </a:solidFill>
-              </a:rPr>
-              <a:t>Presentación Proyecto</a:t>
-            </a:r>
-          </a:p>
-          <a:p>
-            <a:pPr marL="444500" indent="-285750">
-              <a:buFont typeface="Arial" panose="020B0604020202020204" pitchFamily="34" charset="0"/>
-              <a:buChar char="•"/>
-            </a:pPr>
-            <a:r>
-              <a:rPr lang="es-ES" dirty="0">
-                <a:solidFill>
-                  <a:schemeClr val="tx1">
-                    <a:lumMod val="75000"/>
-                    <a:lumOff val="25000"/>
-                  </a:schemeClr>
-                </a:solidFill>
-              </a:rPr>
-              <a:t>Levantamiento de Información</a:t>
-            </a:r>
-          </a:p>
-          <a:p>
-            <a:pPr marL="444500" indent="-285750">
-              <a:buFont typeface="Arial" panose="020B0604020202020204" pitchFamily="34" charset="0"/>
-              <a:buChar char="•"/>
-            </a:pPr>
-            <a:r>
-              <a:rPr lang="es-ES" dirty="0">
-                <a:solidFill>
-                  <a:schemeClr val="tx1">
-                    <a:lumMod val="75000"/>
-                    <a:lumOff val="25000"/>
-                  </a:schemeClr>
-                </a:solidFill>
-              </a:rPr>
-              <a:t>Diagrama de Procesos</a:t>
-            </a:r>
-          </a:p>
-          <a:p>
-            <a:pPr marL="444500" indent="-285750">
-              <a:buFont typeface="Arial" panose="020B0604020202020204" pitchFamily="34" charset="0"/>
-              <a:buChar char="•"/>
-            </a:pPr>
-            <a:r>
-              <a:rPr lang="es-ES" dirty="0" err="1">
-                <a:solidFill>
-                  <a:schemeClr val="tx1">
-                    <a:lumMod val="75000"/>
-                    <a:lumOff val="25000"/>
-                  </a:schemeClr>
-                </a:solidFill>
-              </a:rPr>
-              <a:t>Preeliminar</a:t>
-            </a:r>
-            <a:r>
-              <a:rPr lang="es-ES" dirty="0">
-                <a:solidFill>
-                  <a:schemeClr val="tx1">
-                    <a:lumMod val="75000"/>
-                    <a:lumOff val="25000"/>
-                  </a:schemeClr>
-                </a:solidFill>
-              </a:rPr>
-              <a:t> Inventario</a:t>
-            </a:r>
-          </a:p>
-          <a:p>
-            <a:pPr marL="444500" indent="-285750">
-              <a:buFont typeface="Arial" panose="020B0604020202020204" pitchFamily="34" charset="0"/>
-              <a:buChar char="•"/>
-            </a:pPr>
-            <a:r>
-              <a:rPr lang="es-ES" dirty="0">
-                <a:solidFill>
-                  <a:schemeClr val="tx1">
-                    <a:lumMod val="75000"/>
-                    <a:lumOff val="25000"/>
-                  </a:schemeClr>
-                </a:solidFill>
-              </a:rPr>
-              <a:t>Formulación del Proyecto</a:t>
-            </a:r>
-          </a:p>
-          <a:p>
-            <a:pPr marL="444500" indent="-285750">
-              <a:buFont typeface="Arial" panose="020B0604020202020204" pitchFamily="34" charset="0"/>
-              <a:buChar char="•"/>
-            </a:pPr>
-            <a:r>
-              <a:rPr lang="es-ES" dirty="0">
-                <a:solidFill>
-                  <a:schemeClr val="tx1">
-                    <a:lumMod val="75000"/>
-                    <a:lumOff val="25000"/>
-                  </a:schemeClr>
-                </a:solidFill>
-              </a:rPr>
-              <a:t>IEEE-830</a:t>
-            </a:r>
-          </a:p>
-          <a:p>
-            <a:pPr marL="444500" indent="-285750">
-              <a:buFont typeface="Arial" panose="020B0604020202020204" pitchFamily="34" charset="0"/>
-              <a:buChar char="•"/>
-            </a:pPr>
-            <a:r>
-              <a:rPr lang="es-ES" u="sng" dirty="0">
-                <a:solidFill>
-                  <a:schemeClr val="tx1">
-                    <a:lumMod val="75000"/>
-                    <a:lumOff val="25000"/>
-                  </a:schemeClr>
-                </a:solidFill>
-                <a:hlinkClick r:id="rId3"/>
-              </a:rPr>
-              <a:t>Entregables 1er </a:t>
-            </a:r>
-            <a:r>
-              <a:rPr lang="es-ES" u="sng" dirty="0" err="1">
-                <a:solidFill>
-                  <a:schemeClr val="tx1">
-                    <a:lumMod val="75000"/>
-                    <a:lumOff val="25000"/>
-                  </a:schemeClr>
-                </a:solidFill>
-                <a:hlinkClick r:id="rId3"/>
-              </a:rPr>
-              <a:t>Trim</a:t>
-            </a:r>
-            <a:endParaRPr lang="es-ES_tradnl" sz="1400" b="1" u="sng" dirty="0">
-              <a:solidFill>
-                <a:schemeClr val="tx1">
-                  <a:lumMod val="75000"/>
-                  <a:lumOff val="25000"/>
-                </a:schemeClr>
-              </a:solidFill>
-            </a:endParaRPr>
-          </a:p>
-          <a:p>
-            <a:pPr>
-              <a:lnSpc>
-                <a:spcPct val="120000"/>
-              </a:lnSpc>
-            </a:pPr>
-            <a:endParaRPr lang="es-ES" sz="1200" dirty="0">
-              <a:solidFill>
-                <a:schemeClr val="tx1">
-                  <a:lumMod val="75000"/>
-                  <a:lumOff val="25000"/>
-                </a:schemeClr>
-              </a:solidFill>
-            </a:endParaRPr>
-          </a:p>
-        </p:txBody>
-      </p:sp>
-      <p:sp>
-        <p:nvSpPr>
-          <p:cNvPr id="6" name="CuadroTexto 5"/>
-          <p:cNvSpPr txBox="1"/>
-          <p:nvPr/>
-        </p:nvSpPr>
-        <p:spPr>
-          <a:xfrm>
-            <a:off x="509443" y="303360"/>
-            <a:ext cx="4557507" cy="646331"/>
-          </a:xfrm>
-          <a:prstGeom prst="rect">
-            <a:avLst/>
-          </a:prstGeom>
-          <a:noFill/>
-        </p:spPr>
-        <p:txBody>
-          <a:bodyPr wrap="square" rtlCol="0">
-            <a:spAutoFit/>
-          </a:bodyPr>
-          <a:lstStyle/>
-          <a:p>
-            <a:r>
-              <a:rPr lang="es-ES" b="1" dirty="0">
-                <a:solidFill>
-                  <a:schemeClr val="tx1">
-                    <a:lumMod val="75000"/>
-                    <a:lumOff val="25000"/>
-                  </a:schemeClr>
-                </a:solidFill>
-              </a:rPr>
-              <a:t>Entregables Proyecto Formativo </a:t>
-            </a:r>
-          </a:p>
-          <a:p>
-            <a:r>
-              <a:rPr lang="es-ES" b="1" dirty="0">
-                <a:solidFill>
-                  <a:schemeClr val="tx1">
-                    <a:lumMod val="75000"/>
-                    <a:lumOff val="25000"/>
-                  </a:schemeClr>
-                </a:solidFill>
-              </a:rPr>
-              <a:t>Primer Trimestre</a:t>
-            </a:r>
-          </a:p>
-        </p:txBody>
-      </p:sp>
-      <p:sp>
-        <p:nvSpPr>
-          <p:cNvPr id="7" name="Rectángulo 6"/>
-          <p:cNvSpPr/>
-          <p:nvPr/>
-        </p:nvSpPr>
-        <p:spPr>
-          <a:xfrm>
-            <a:off x="607405" y="957918"/>
-            <a:ext cx="718487" cy="45719"/>
-          </a:xfrm>
-          <a:prstGeom prst="rect">
-            <a:avLst/>
-          </a:prstGeom>
-          <a:solidFill>
-            <a:srgbClr val="FF6600"/>
-          </a:solidFill>
-          <a:ln>
-            <a:noFill/>
-          </a:ln>
-          <a:effectLst/>
-        </p:spPr>
-        <p:style>
-          <a:lnRef idx="1">
-            <a:schemeClr val="accent1"/>
-          </a:lnRef>
-          <a:fillRef idx="3">
-            <a:schemeClr val="accent1"/>
-          </a:fillRef>
-          <a:effectRef idx="2">
-            <a:schemeClr val="accent1"/>
-          </a:effectRef>
-          <a:fontRef idx="minor">
-            <a:schemeClr val="lt1"/>
-          </a:fontRef>
-        </p:style>
-        <p:txBody>
-          <a:bodyPr rtlCol="0" anchor="ctr"/>
-          <a:lstStyle/>
-          <a:p>
-            <a:pPr algn="ctr"/>
-            <a:endParaRPr lang="es-ES"/>
-          </a:p>
-        </p:txBody>
-      </p:sp>
-      <p:sp>
-        <p:nvSpPr>
-          <p:cNvPr id="8" name="Rectángulo 7">
-            <a:hlinkClick r:id="rId4" action="ppaction://hlinksldjump"/>
-          </p:cNvPr>
-          <p:cNvSpPr/>
-          <p:nvPr/>
-        </p:nvSpPr>
-        <p:spPr>
-          <a:xfrm>
-            <a:off x="8212822" y="192947"/>
-            <a:ext cx="746620" cy="679508"/>
-          </a:xfrm>
-          <a:prstGeom prst="rect">
-            <a:avLst/>
-          </a:prstGeom>
-          <a:noFill/>
-          <a:ln>
-            <a:noFill/>
-          </a:ln>
-        </p:spPr>
-        <p:style>
-          <a:lnRef idx="1">
-            <a:schemeClr val="accent1"/>
-          </a:lnRef>
-          <a:fillRef idx="3">
-            <a:schemeClr val="accent1"/>
-          </a:fillRef>
-          <a:effectRef idx="2">
-            <a:schemeClr val="accent1"/>
-          </a:effectRef>
-          <a:fontRef idx="minor">
-            <a:schemeClr val="lt1"/>
-          </a:fontRef>
-        </p:style>
-        <p:txBody>
-          <a:bodyPr rtlCol="0" anchor="ctr"/>
-          <a:lstStyle/>
-          <a:p>
-            <a:pPr algn="ctr"/>
-            <a:endParaRPr lang="es-CO"/>
-          </a:p>
-        </p:txBody>
-      </p:sp>
-      <p:pic>
-        <p:nvPicPr>
-          <p:cNvPr id="11" name="Imagen 10">
-            <a:extLst>
-              <a:ext uri="{FF2B5EF4-FFF2-40B4-BE49-F238E27FC236}">
-                <a16:creationId xmlns:a16="http://schemas.microsoft.com/office/drawing/2014/main" id="{152395C0-D961-4A73-9B47-F1BADE5FC15C}"/>
-              </a:ext>
-            </a:extLst>
-          </p:cNvPr>
-          <p:cNvPicPr>
-            <a:picLocks noChangeAspect="1"/>
-          </p:cNvPicPr>
-          <p:nvPr/>
-        </p:nvPicPr>
-        <p:blipFill>
-          <a:blip r:embed="rId5"/>
-          <a:stretch>
-            <a:fillRect/>
-          </a:stretch>
-        </p:blipFill>
-        <p:spPr>
-          <a:xfrm>
-            <a:off x="7966247" y="4031382"/>
-            <a:ext cx="1007830" cy="1007830"/>
-          </a:xfrm>
-          <a:prstGeom prst="rect">
-            <a:avLst/>
-          </a:prstGeom>
-        </p:spPr>
-      </p:pic>
-    </p:spTree>
-    <p:extLst>
-      <p:ext uri="{BB962C8B-B14F-4D97-AF65-F5344CB8AC3E}">
-        <p14:creationId xmlns:p14="http://schemas.microsoft.com/office/powerpoint/2010/main" val="3047930190"/>
       </p:ext>
     </p:extLst>
   </p:cSld>
@@ -3740,6 +3931,501 @@
       </p:grpSpPr>
       <p:sp>
         <p:nvSpPr>
+          <p:cNvPr id="2" name="CuadroTexto 1"/>
+          <p:cNvSpPr txBox="1"/>
+          <p:nvPr/>
+        </p:nvSpPr>
+        <p:spPr>
+          <a:xfrm>
+            <a:off x="382867" y="249495"/>
+            <a:ext cx="5413925" cy="646331"/>
+          </a:xfrm>
+          <a:prstGeom prst="rect">
+            <a:avLst/>
+          </a:prstGeom>
+          <a:noFill/>
+        </p:spPr>
+        <p:txBody>
+          <a:bodyPr wrap="square" rtlCol="0">
+            <a:spAutoFit/>
+          </a:bodyPr>
+          <a:lstStyle/>
+          <a:p>
+            <a:r>
+              <a:rPr lang="es-ES" sz="3600" b="1" dirty="0">
+                <a:solidFill>
+                  <a:schemeClr val="bg1"/>
+                </a:solidFill>
+              </a:rPr>
+              <a:t>Alcance</a:t>
+            </a:r>
+          </a:p>
+        </p:txBody>
+      </p:sp>
+      <p:sp>
+        <p:nvSpPr>
+          <p:cNvPr id="5" name="Rectángulo 4"/>
+          <p:cNvSpPr/>
+          <p:nvPr/>
+        </p:nvSpPr>
+        <p:spPr>
+          <a:xfrm>
+            <a:off x="365298" y="1629823"/>
+            <a:ext cx="8413403" cy="2554545"/>
+          </a:xfrm>
+          <a:prstGeom prst="rect">
+            <a:avLst/>
+          </a:prstGeom>
+        </p:spPr>
+        <p:txBody>
+          <a:bodyPr wrap="square">
+            <a:spAutoFit/>
+          </a:bodyPr>
+          <a:lstStyle/>
+          <a:p>
+            <a:pPr algn="just"/>
+            <a:r>
+              <a:rPr lang="es-ES" sz="1600" dirty="0">
+                <a:solidFill>
+                  <a:schemeClr val="tx1">
+                    <a:lumMod val="75000"/>
+                    <a:lumOff val="25000"/>
+                  </a:schemeClr>
+                </a:solidFill>
+              </a:rPr>
+              <a:t>	El Sistema solamente se encargará de almacenar información y consultar esta en la base de datos, será una herramienta netamente de apoyo logístico y organizacional, la efectividad del mismo depende del correcto uso por parte de los diferentes roles, de la veracidad de la información suministrada al mismo.</a:t>
+            </a:r>
+          </a:p>
+          <a:p>
+            <a:pPr algn="just"/>
+            <a:endParaRPr lang="es-ES" sz="1600" dirty="0">
+              <a:solidFill>
+                <a:schemeClr val="tx1">
+                  <a:lumMod val="75000"/>
+                  <a:lumOff val="25000"/>
+                </a:schemeClr>
+              </a:solidFill>
+            </a:endParaRPr>
+          </a:p>
+          <a:p>
+            <a:pPr algn="just"/>
+            <a:r>
+              <a:rPr lang="es-ES" sz="1600" dirty="0">
+                <a:solidFill>
+                  <a:schemeClr val="tx1">
+                    <a:lumMod val="75000"/>
+                    <a:lumOff val="25000"/>
+                  </a:schemeClr>
+                </a:solidFill>
+              </a:rPr>
+              <a:t>	El sistema no permitirá cambios administrativos (Cambios de precios, de existencias y de historial de venta) si no es autorizado por el administrador, adicionalmente el aplicativo web no establecerá comunicaciones entre roles ya que su objetivo fundamental es crear un método de consulta para organización y optimización en la venta y control de almacenado de productos.</a:t>
+            </a:r>
+          </a:p>
+          <a:p>
+            <a:endParaRPr lang="es-ES" sz="1600" dirty="0">
+              <a:solidFill>
+                <a:schemeClr val="tx1">
+                  <a:lumMod val="75000"/>
+                  <a:lumOff val="25000"/>
+                </a:schemeClr>
+              </a:solidFill>
+            </a:endParaRPr>
+          </a:p>
+        </p:txBody>
+      </p:sp>
+      <p:sp>
+        <p:nvSpPr>
+          <p:cNvPr id="14" name="Rectángulo 13">
+            <a:hlinkClick r:id="rId2" action="ppaction://hlinksldjump"/>
+          </p:cNvPr>
+          <p:cNvSpPr/>
+          <p:nvPr/>
+        </p:nvSpPr>
+        <p:spPr>
+          <a:xfrm>
+            <a:off x="8212822" y="192947"/>
+            <a:ext cx="746620" cy="679508"/>
+          </a:xfrm>
+          <a:prstGeom prst="rect">
+            <a:avLst/>
+          </a:prstGeom>
+          <a:noFill/>
+          <a:ln>
+            <a:noFill/>
+          </a:ln>
+        </p:spPr>
+        <p:style>
+          <a:lnRef idx="1">
+            <a:schemeClr val="accent1"/>
+          </a:lnRef>
+          <a:fillRef idx="3">
+            <a:schemeClr val="accent1"/>
+          </a:fillRef>
+          <a:effectRef idx="2">
+            <a:schemeClr val="accent1"/>
+          </a:effectRef>
+          <a:fontRef idx="minor">
+            <a:schemeClr val="lt1"/>
+          </a:fontRef>
+        </p:style>
+        <p:txBody>
+          <a:bodyPr rtlCol="0" anchor="ctr"/>
+          <a:lstStyle/>
+          <a:p>
+            <a:pPr algn="ctr"/>
+            <a:endParaRPr lang="es-CO"/>
+          </a:p>
+        </p:txBody>
+      </p:sp>
+      <p:pic>
+        <p:nvPicPr>
+          <p:cNvPr id="7" name="Imagen 6">
+            <a:extLst>
+              <a:ext uri="{FF2B5EF4-FFF2-40B4-BE49-F238E27FC236}">
+                <a16:creationId xmlns:a16="http://schemas.microsoft.com/office/drawing/2014/main" id="{0525457E-4782-41F4-B946-D2A9F21E6076}"/>
+              </a:ext>
+            </a:extLst>
+          </p:cNvPr>
+          <p:cNvPicPr>
+            <a:picLocks noChangeAspect="1"/>
+          </p:cNvPicPr>
+          <p:nvPr/>
+        </p:nvPicPr>
+        <p:blipFill>
+          <a:blip r:embed="rId3"/>
+          <a:stretch>
+            <a:fillRect/>
+          </a:stretch>
+        </p:blipFill>
+        <p:spPr>
+          <a:xfrm>
+            <a:off x="7966247" y="4031382"/>
+            <a:ext cx="1007830" cy="1007830"/>
+          </a:xfrm>
+          <a:prstGeom prst="rect">
+            <a:avLst/>
+          </a:prstGeom>
+        </p:spPr>
+      </p:pic>
+    </p:spTree>
+    <p:extLst>
+      <p:ext uri="{BB962C8B-B14F-4D97-AF65-F5344CB8AC3E}">
+        <p14:creationId xmlns:p14="http://schemas.microsoft.com/office/powerpoint/2010/main" val="364966841"/>
+      </p:ext>
+    </p:extLst>
+  </p:cSld>
+  <p:clrMapOvr>
+    <a:masterClrMapping/>
+  </p:clrMapOvr>
+</p:sld>
+</file>
+
+<file path=ppt/slides/slide14.xml><?xml version="1.0" encoding="utf-8"?>
+<p:sld xmlns:a="http://schemas.openxmlformats.org/drawingml/2006/main" xmlns:r="http://schemas.openxmlformats.org/officeDocument/2006/relationships" xmlns:p="http://schemas.openxmlformats.org/presentationml/2006/main">
+  <p:cSld>
+    <p:spTree>
+      <p:nvGrpSpPr>
+        <p:cNvPr id="1" name=""/>
+        <p:cNvGrpSpPr/>
+        <p:nvPr/>
+      </p:nvGrpSpPr>
+      <p:grpSpPr>
+        <a:xfrm>
+          <a:off x="0" y="0"/>
+          <a:ext cx="0" cy="0"/>
+          <a:chOff x="0" y="0"/>
+          <a:chExt cx="0" cy="0"/>
+        </a:xfrm>
+      </p:grpSpPr>
+      <p:sp>
+        <p:nvSpPr>
+          <p:cNvPr id="2" name="CuadroTexto 1"/>
+          <p:cNvSpPr txBox="1"/>
+          <p:nvPr/>
+        </p:nvSpPr>
+        <p:spPr>
+          <a:xfrm>
+            <a:off x="382867" y="249495"/>
+            <a:ext cx="5413925" cy="646331"/>
+          </a:xfrm>
+          <a:prstGeom prst="rect">
+            <a:avLst/>
+          </a:prstGeom>
+          <a:noFill/>
+        </p:spPr>
+        <p:txBody>
+          <a:bodyPr wrap="square" rtlCol="0">
+            <a:spAutoFit/>
+          </a:bodyPr>
+          <a:lstStyle/>
+          <a:p>
+            <a:r>
+              <a:rPr lang="es-ES" sz="3600" b="1" dirty="0">
+                <a:solidFill>
+                  <a:schemeClr val="bg1"/>
+                </a:solidFill>
+              </a:rPr>
+              <a:t>Alcance</a:t>
+            </a:r>
+          </a:p>
+        </p:txBody>
+      </p:sp>
+      <p:sp>
+        <p:nvSpPr>
+          <p:cNvPr id="5" name="Rectángulo 4"/>
+          <p:cNvSpPr/>
+          <p:nvPr/>
+        </p:nvSpPr>
+        <p:spPr>
+          <a:xfrm>
+            <a:off x="3570194" y="1259039"/>
+            <a:ext cx="5210324" cy="2800767"/>
+          </a:xfrm>
+          <a:prstGeom prst="rect">
+            <a:avLst/>
+          </a:prstGeom>
+        </p:spPr>
+        <p:txBody>
+          <a:bodyPr wrap="square">
+            <a:spAutoFit/>
+          </a:bodyPr>
+          <a:lstStyle/>
+          <a:p>
+            <a:pPr algn="just"/>
+            <a:r>
+              <a:rPr lang="es-ES" sz="1600" dirty="0">
+                <a:solidFill>
+                  <a:schemeClr val="tx1">
+                    <a:lumMod val="75000"/>
+                    <a:lumOff val="25000"/>
+                  </a:schemeClr>
+                </a:solidFill>
+              </a:rPr>
+              <a:t>	El Sistema de información será desarrollado utilizando el modelo de vista controlador utilizando HTML para estructurar el sitio web, CSS para aplicar estilos, para la programación orientada a objetos se utilizará </a:t>
+            </a:r>
+            <a:r>
+              <a:rPr lang="es-ES" sz="1600" dirty="0" err="1">
+                <a:solidFill>
+                  <a:schemeClr val="tx1">
+                    <a:lumMod val="75000"/>
+                    <a:lumOff val="25000"/>
+                  </a:schemeClr>
+                </a:solidFill>
+              </a:rPr>
+              <a:t>Javascript</a:t>
+            </a:r>
+            <a:r>
+              <a:rPr lang="es-ES" sz="1600" dirty="0">
+                <a:solidFill>
+                  <a:schemeClr val="tx1">
+                    <a:lumMod val="75000"/>
+                    <a:lumOff val="25000"/>
+                  </a:schemeClr>
+                </a:solidFill>
+              </a:rPr>
+              <a:t> por parte del cliente y PHP por parte del servidor, para el almacenado de información en base de datos se utilizará lenguaje SQL.</a:t>
+            </a:r>
+          </a:p>
+          <a:p>
+            <a:pPr algn="just"/>
+            <a:endParaRPr lang="es-ES" sz="1600" dirty="0">
+              <a:solidFill>
+                <a:schemeClr val="tx1">
+                  <a:lumMod val="75000"/>
+                  <a:lumOff val="25000"/>
+                </a:schemeClr>
+              </a:solidFill>
+            </a:endParaRPr>
+          </a:p>
+          <a:p>
+            <a:pPr algn="just"/>
+            <a:r>
+              <a:rPr lang="es-ES" sz="1600" dirty="0">
+                <a:solidFill>
+                  <a:schemeClr val="tx1">
+                    <a:lumMod val="75000"/>
+                    <a:lumOff val="25000"/>
+                  </a:schemeClr>
+                </a:solidFill>
+              </a:rPr>
+              <a:t>	CI Cash </a:t>
+            </a:r>
+            <a:r>
+              <a:rPr lang="es-ES" sz="1600" dirty="0" err="1">
+                <a:solidFill>
+                  <a:schemeClr val="tx1">
+                    <a:lumMod val="75000"/>
+                    <a:lumOff val="25000"/>
+                  </a:schemeClr>
+                </a:solidFill>
+              </a:rPr>
+              <a:t>Inventory</a:t>
+            </a:r>
+            <a:r>
+              <a:rPr lang="es-ES" sz="1600" dirty="0">
+                <a:solidFill>
+                  <a:schemeClr val="tx1">
+                    <a:lumMod val="75000"/>
+                    <a:lumOff val="25000"/>
+                  </a:schemeClr>
+                </a:solidFill>
+              </a:rPr>
+              <a:t> será desarrollado en 2 años distribuidos en 8 trimestres pasando por etapas tales como análisis, planeación, ejecución y evaluación.</a:t>
+            </a:r>
+          </a:p>
+        </p:txBody>
+      </p:sp>
+      <p:sp>
+        <p:nvSpPr>
+          <p:cNvPr id="14" name="Rectángulo 13">
+            <a:hlinkClick r:id="rId2" action="ppaction://hlinksldjump"/>
+          </p:cNvPr>
+          <p:cNvSpPr/>
+          <p:nvPr/>
+        </p:nvSpPr>
+        <p:spPr>
+          <a:xfrm>
+            <a:off x="8212822" y="192947"/>
+            <a:ext cx="746620" cy="679508"/>
+          </a:xfrm>
+          <a:prstGeom prst="rect">
+            <a:avLst/>
+          </a:prstGeom>
+          <a:noFill/>
+          <a:ln>
+            <a:noFill/>
+          </a:ln>
+        </p:spPr>
+        <p:style>
+          <a:lnRef idx="1">
+            <a:schemeClr val="accent1"/>
+          </a:lnRef>
+          <a:fillRef idx="3">
+            <a:schemeClr val="accent1"/>
+          </a:fillRef>
+          <a:effectRef idx="2">
+            <a:schemeClr val="accent1"/>
+          </a:effectRef>
+          <a:fontRef idx="minor">
+            <a:schemeClr val="lt1"/>
+          </a:fontRef>
+        </p:style>
+        <p:txBody>
+          <a:bodyPr rtlCol="0" anchor="ctr"/>
+          <a:lstStyle/>
+          <a:p>
+            <a:pPr algn="ctr"/>
+            <a:endParaRPr lang="es-CO"/>
+          </a:p>
+        </p:txBody>
+      </p:sp>
+      <p:pic>
+        <p:nvPicPr>
+          <p:cNvPr id="7" name="Imagen 6">
+            <a:extLst>
+              <a:ext uri="{FF2B5EF4-FFF2-40B4-BE49-F238E27FC236}">
+                <a16:creationId xmlns:a16="http://schemas.microsoft.com/office/drawing/2014/main" id="{0525457E-4782-41F4-B946-D2A9F21E6076}"/>
+              </a:ext>
+            </a:extLst>
+          </p:cNvPr>
+          <p:cNvPicPr>
+            <a:picLocks noChangeAspect="1"/>
+          </p:cNvPicPr>
+          <p:nvPr/>
+        </p:nvPicPr>
+        <p:blipFill>
+          <a:blip r:embed="rId3"/>
+          <a:stretch>
+            <a:fillRect/>
+          </a:stretch>
+        </p:blipFill>
+        <p:spPr>
+          <a:xfrm>
+            <a:off x="7966247" y="4031382"/>
+            <a:ext cx="1007830" cy="1007830"/>
+          </a:xfrm>
+          <a:prstGeom prst="rect">
+            <a:avLst/>
+          </a:prstGeom>
+        </p:spPr>
+      </p:pic>
+      <p:pic>
+        <p:nvPicPr>
+          <p:cNvPr id="1026" name="Picture 2" descr="Reloj De Arena, Tiempo, Horas, Reloj">
+            <a:extLst>
+              <a:ext uri="{FF2B5EF4-FFF2-40B4-BE49-F238E27FC236}">
+                <a16:creationId xmlns:a16="http://schemas.microsoft.com/office/drawing/2014/main" id="{EEF25F0C-D0C0-49CF-B99B-1EBF172D92AE}"/>
+              </a:ext>
+            </a:extLst>
+          </p:cNvPr>
+          <p:cNvPicPr>
+            <a:picLocks noChangeAspect="1" noChangeArrowheads="1"/>
+          </p:cNvPicPr>
+          <p:nvPr/>
+        </p:nvPicPr>
+        <p:blipFill rotWithShape="1">
+          <a:blip r:embed="rId4">
+            <a:extLst>
+              <a:ext uri="{28A0092B-C50C-407E-A947-70E740481C1C}">
+                <a14:useLocalDpi xmlns:a14="http://schemas.microsoft.com/office/drawing/2010/main" val="0"/>
+              </a:ext>
+            </a:extLst>
+          </a:blip>
+          <a:srcRect l="11167" r="25882"/>
+          <a:stretch/>
+        </p:blipFill>
+        <p:spPr bwMode="auto">
+          <a:xfrm>
+            <a:off x="0" y="1068670"/>
+            <a:ext cx="3423994" cy="4074830"/>
+          </a:xfrm>
+          <a:prstGeom prst="rect">
+            <a:avLst/>
+          </a:prstGeom>
+          <a:noFill/>
+          <a:extLst>
+            <a:ext uri="{909E8E84-426E-40DD-AFC4-6F175D3DCCD1}">
+              <a14:hiddenFill xmlns:a14="http://schemas.microsoft.com/office/drawing/2010/main">
+                <a:solidFill>
+                  <a:srgbClr val="FFFFFF"/>
+                </a:solidFill>
+              </a14:hiddenFill>
+            </a:ext>
+          </a:extLst>
+        </p:spPr>
+      </p:pic>
+    </p:spTree>
+    <p:extLst>
+      <p:ext uri="{BB962C8B-B14F-4D97-AF65-F5344CB8AC3E}">
+        <p14:creationId xmlns:p14="http://schemas.microsoft.com/office/powerpoint/2010/main" val="2743064212"/>
+      </p:ext>
+    </p:extLst>
+  </p:cSld>
+  <p:clrMapOvr>
+    <a:masterClrMapping/>
+  </p:clrMapOvr>
+</p:sld>
+</file>
+
+<file path=ppt/slides/slide15.xml><?xml version="1.0" encoding="utf-8"?>
+<p:sld xmlns:a="http://schemas.openxmlformats.org/drawingml/2006/main" xmlns:r="http://schemas.openxmlformats.org/officeDocument/2006/relationships" xmlns:p="http://schemas.openxmlformats.org/presentationml/2006/main">
+  <p:cSld>
+    <p:spTree>
+      <p:nvGrpSpPr>
+        <p:cNvPr id="1" name=""/>
+        <p:cNvGrpSpPr/>
+        <p:nvPr/>
+      </p:nvGrpSpPr>
+      <p:grpSpPr>
+        <a:xfrm>
+          <a:off x="0" y="0"/>
+          <a:ext cx="0" cy="0"/>
+          <a:chOff x="0" y="0"/>
+          <a:chExt cx="0" cy="0"/>
+        </a:xfrm>
+      </p:grpSpPr>
+      <p:sp>
+        <p:nvSpPr>
           <p:cNvPr id="5" name="Rectángulo 4"/>
           <p:cNvSpPr/>
           <p:nvPr/>
@@ -5355,7 +6041,367 @@
 </p:sld>
 </file>
 
-<file path=ppt/slides/slide14.xml><?xml version="1.0" encoding="utf-8"?>
+<file path=ppt/slides/slide16.xml><?xml version="1.0" encoding="utf-8"?>
+<p:sld xmlns:a="http://schemas.openxmlformats.org/drawingml/2006/main" xmlns:r="http://schemas.openxmlformats.org/officeDocument/2006/relationships" xmlns:p="http://schemas.openxmlformats.org/presentationml/2006/main">
+  <p:cSld>
+    <p:spTree>
+      <p:nvGrpSpPr>
+        <p:cNvPr id="1" name=""/>
+        <p:cNvGrpSpPr/>
+        <p:nvPr/>
+      </p:nvGrpSpPr>
+      <p:grpSpPr>
+        <a:xfrm>
+          <a:off x="0" y="0"/>
+          <a:ext cx="0" cy="0"/>
+          <a:chOff x="0" y="0"/>
+          <a:chExt cx="0" cy="0"/>
+        </a:xfrm>
+      </p:grpSpPr>
+      <p:sp>
+        <p:nvSpPr>
+          <p:cNvPr id="5" name="Rectángulo 4"/>
+          <p:cNvSpPr/>
+          <p:nvPr/>
+        </p:nvSpPr>
+        <p:spPr>
+          <a:xfrm>
+            <a:off x="2668056" y="1517276"/>
+            <a:ext cx="6834610" cy="2348976"/>
+          </a:xfrm>
+          <a:prstGeom prst="rect">
+            <a:avLst/>
+          </a:prstGeom>
+          <a:noFill/>
+        </p:spPr>
+        <p:txBody>
+          <a:bodyPr wrap="square" anchor="t" anchorCtr="0">
+            <a:spAutoFit/>
+          </a:bodyPr>
+          <a:lstStyle/>
+          <a:p>
+            <a:pPr>
+              <a:lnSpc>
+                <a:spcPct val="120000"/>
+              </a:lnSpc>
+            </a:pPr>
+            <a:r>
+              <a:rPr lang="es-ES_tradnl" sz="3600" b="1" dirty="0">
+                <a:solidFill>
+                  <a:schemeClr val="tx1">
+                    <a:lumMod val="75000"/>
+                    <a:lumOff val="25000"/>
+                  </a:schemeClr>
+                </a:solidFill>
+              </a:rPr>
+              <a:t>Primer Trimestre</a:t>
+            </a:r>
+          </a:p>
+          <a:p>
+            <a:pPr marL="444500" indent="-285750">
+              <a:buFont typeface="Arial" panose="020B0604020202020204" pitchFamily="34" charset="0"/>
+              <a:buChar char="•"/>
+            </a:pPr>
+            <a:r>
+              <a:rPr lang="es-ES" dirty="0">
+                <a:solidFill>
+                  <a:schemeClr val="tx1">
+                    <a:lumMod val="75000"/>
+                    <a:lumOff val="25000"/>
+                  </a:schemeClr>
+                </a:solidFill>
+              </a:rPr>
+              <a:t>Presentación Proyecto</a:t>
+            </a:r>
+          </a:p>
+          <a:p>
+            <a:pPr marL="444500" indent="-285750">
+              <a:buFont typeface="Arial" panose="020B0604020202020204" pitchFamily="34" charset="0"/>
+              <a:buChar char="•"/>
+            </a:pPr>
+            <a:r>
+              <a:rPr lang="es-ES" dirty="0">
+                <a:solidFill>
+                  <a:schemeClr val="tx1">
+                    <a:lumMod val="75000"/>
+                    <a:lumOff val="25000"/>
+                  </a:schemeClr>
+                </a:solidFill>
+              </a:rPr>
+              <a:t>Levantamiento de Información</a:t>
+            </a:r>
+          </a:p>
+          <a:p>
+            <a:pPr marL="444500" indent="-285750">
+              <a:buFont typeface="Arial" panose="020B0604020202020204" pitchFamily="34" charset="0"/>
+              <a:buChar char="•"/>
+            </a:pPr>
+            <a:r>
+              <a:rPr lang="es-ES" dirty="0">
+                <a:solidFill>
+                  <a:schemeClr val="tx1">
+                    <a:lumMod val="75000"/>
+                    <a:lumOff val="25000"/>
+                  </a:schemeClr>
+                </a:solidFill>
+              </a:rPr>
+              <a:t>Diagrama de Procesos</a:t>
+            </a:r>
+          </a:p>
+          <a:p>
+            <a:pPr marL="444500" indent="-285750">
+              <a:buFont typeface="Arial" panose="020B0604020202020204" pitchFamily="34" charset="0"/>
+              <a:buChar char="•"/>
+            </a:pPr>
+            <a:r>
+              <a:rPr lang="es-ES" dirty="0">
+                <a:solidFill>
+                  <a:schemeClr val="tx1">
+                    <a:lumMod val="75000"/>
+                    <a:lumOff val="25000"/>
+                  </a:schemeClr>
+                </a:solidFill>
+              </a:rPr>
+              <a:t>Formulación del Proyecto</a:t>
+            </a:r>
+          </a:p>
+          <a:p>
+            <a:pPr marL="444500" indent="-285750">
+              <a:buFont typeface="Arial" panose="020B0604020202020204" pitchFamily="34" charset="0"/>
+              <a:buChar char="•"/>
+            </a:pPr>
+            <a:r>
+              <a:rPr lang="es-ES" u="sng" dirty="0">
+                <a:solidFill>
+                  <a:schemeClr val="tx1">
+                    <a:lumMod val="75000"/>
+                    <a:lumOff val="25000"/>
+                  </a:schemeClr>
+                </a:solidFill>
+                <a:hlinkClick r:id="rId3"/>
+              </a:rPr>
+              <a:t>Entregables 1er </a:t>
+            </a:r>
+            <a:r>
+              <a:rPr lang="es-ES" u="sng" dirty="0" err="1">
+                <a:solidFill>
+                  <a:schemeClr val="tx1">
+                    <a:lumMod val="75000"/>
+                    <a:lumOff val="25000"/>
+                  </a:schemeClr>
+                </a:solidFill>
+                <a:hlinkClick r:id="rId3"/>
+              </a:rPr>
+              <a:t>Trim</a:t>
+            </a:r>
+            <a:endParaRPr lang="es-ES_tradnl" sz="1400" b="1" u="sng" dirty="0">
+              <a:solidFill>
+                <a:schemeClr val="tx1">
+                  <a:lumMod val="75000"/>
+                  <a:lumOff val="25000"/>
+                </a:schemeClr>
+              </a:solidFill>
+            </a:endParaRPr>
+          </a:p>
+          <a:p>
+            <a:pPr>
+              <a:lnSpc>
+                <a:spcPct val="120000"/>
+              </a:lnSpc>
+            </a:pPr>
+            <a:endParaRPr lang="es-ES" sz="1200" dirty="0">
+              <a:solidFill>
+                <a:schemeClr val="tx1">
+                  <a:lumMod val="75000"/>
+                  <a:lumOff val="25000"/>
+                </a:schemeClr>
+              </a:solidFill>
+            </a:endParaRPr>
+          </a:p>
+        </p:txBody>
+      </p:sp>
+      <p:sp>
+        <p:nvSpPr>
+          <p:cNvPr id="6" name="CuadroTexto 5"/>
+          <p:cNvSpPr txBox="1"/>
+          <p:nvPr/>
+        </p:nvSpPr>
+        <p:spPr>
+          <a:xfrm>
+            <a:off x="509443" y="303360"/>
+            <a:ext cx="4557507" cy="646331"/>
+          </a:xfrm>
+          <a:prstGeom prst="rect">
+            <a:avLst/>
+          </a:prstGeom>
+          <a:noFill/>
+        </p:spPr>
+        <p:txBody>
+          <a:bodyPr wrap="square" rtlCol="0">
+            <a:spAutoFit/>
+          </a:bodyPr>
+          <a:lstStyle/>
+          <a:p>
+            <a:r>
+              <a:rPr lang="es-ES" b="1" dirty="0">
+                <a:solidFill>
+                  <a:schemeClr val="tx1">
+                    <a:lumMod val="75000"/>
+                    <a:lumOff val="25000"/>
+                  </a:schemeClr>
+                </a:solidFill>
+              </a:rPr>
+              <a:t>Entregables Proyecto Formativo </a:t>
+            </a:r>
+          </a:p>
+          <a:p>
+            <a:r>
+              <a:rPr lang="es-ES" b="1" dirty="0">
+                <a:solidFill>
+                  <a:schemeClr val="tx1">
+                    <a:lumMod val="75000"/>
+                    <a:lumOff val="25000"/>
+                  </a:schemeClr>
+                </a:solidFill>
+              </a:rPr>
+              <a:t>Primer Trimestre</a:t>
+            </a:r>
+          </a:p>
+        </p:txBody>
+      </p:sp>
+      <p:sp>
+        <p:nvSpPr>
+          <p:cNvPr id="7" name="Rectángulo 6"/>
+          <p:cNvSpPr/>
+          <p:nvPr/>
+        </p:nvSpPr>
+        <p:spPr>
+          <a:xfrm>
+            <a:off x="607405" y="957918"/>
+            <a:ext cx="718487" cy="45719"/>
+          </a:xfrm>
+          <a:prstGeom prst="rect">
+            <a:avLst/>
+          </a:prstGeom>
+          <a:solidFill>
+            <a:srgbClr val="FF6600"/>
+          </a:solidFill>
+          <a:ln>
+            <a:noFill/>
+          </a:ln>
+          <a:effectLst/>
+        </p:spPr>
+        <p:style>
+          <a:lnRef idx="1">
+            <a:schemeClr val="accent1"/>
+          </a:lnRef>
+          <a:fillRef idx="3">
+            <a:schemeClr val="accent1"/>
+          </a:fillRef>
+          <a:effectRef idx="2">
+            <a:schemeClr val="accent1"/>
+          </a:effectRef>
+          <a:fontRef idx="minor">
+            <a:schemeClr val="lt1"/>
+          </a:fontRef>
+        </p:style>
+        <p:txBody>
+          <a:bodyPr rtlCol="0" anchor="ctr"/>
+          <a:lstStyle/>
+          <a:p>
+            <a:pPr algn="ctr"/>
+            <a:endParaRPr lang="es-ES"/>
+          </a:p>
+        </p:txBody>
+      </p:sp>
+      <p:sp>
+        <p:nvSpPr>
+          <p:cNvPr id="8" name="Rectángulo 7">
+            <a:hlinkClick r:id="rId4" action="ppaction://hlinksldjump"/>
+          </p:cNvPr>
+          <p:cNvSpPr/>
+          <p:nvPr/>
+        </p:nvSpPr>
+        <p:spPr>
+          <a:xfrm>
+            <a:off x="8212822" y="192947"/>
+            <a:ext cx="746620" cy="679508"/>
+          </a:xfrm>
+          <a:prstGeom prst="rect">
+            <a:avLst/>
+          </a:prstGeom>
+          <a:noFill/>
+          <a:ln>
+            <a:noFill/>
+          </a:ln>
+        </p:spPr>
+        <p:style>
+          <a:lnRef idx="1">
+            <a:schemeClr val="accent1"/>
+          </a:lnRef>
+          <a:fillRef idx="3">
+            <a:schemeClr val="accent1"/>
+          </a:fillRef>
+          <a:effectRef idx="2">
+            <a:schemeClr val="accent1"/>
+          </a:effectRef>
+          <a:fontRef idx="minor">
+            <a:schemeClr val="lt1"/>
+          </a:fontRef>
+        </p:style>
+        <p:txBody>
+          <a:bodyPr rtlCol="0" anchor="ctr"/>
+          <a:lstStyle/>
+          <a:p>
+            <a:pPr algn="ctr"/>
+            <a:endParaRPr lang="es-CO"/>
+          </a:p>
+        </p:txBody>
+      </p:sp>
+      <p:pic>
+        <p:nvPicPr>
+          <p:cNvPr id="11" name="Imagen 10">
+            <a:extLst>
+              <a:ext uri="{FF2B5EF4-FFF2-40B4-BE49-F238E27FC236}">
+                <a16:creationId xmlns:a16="http://schemas.microsoft.com/office/drawing/2014/main" id="{152395C0-D961-4A73-9B47-F1BADE5FC15C}"/>
+              </a:ext>
+            </a:extLst>
+          </p:cNvPr>
+          <p:cNvPicPr>
+            <a:picLocks noChangeAspect="1"/>
+          </p:cNvPicPr>
+          <p:nvPr/>
+        </p:nvPicPr>
+        <p:blipFill>
+          <a:blip r:embed="rId5"/>
+          <a:stretch>
+            <a:fillRect/>
+          </a:stretch>
+        </p:blipFill>
+        <p:spPr>
+          <a:xfrm>
+            <a:off x="7966247" y="4031382"/>
+            <a:ext cx="1007830" cy="1007830"/>
+          </a:xfrm>
+          <a:prstGeom prst="rect">
+            <a:avLst/>
+          </a:prstGeom>
+        </p:spPr>
+      </p:pic>
+    </p:spTree>
+    <p:extLst>
+      <p:ext uri="{BB962C8B-B14F-4D97-AF65-F5344CB8AC3E}">
+        <p14:creationId xmlns:p14="http://schemas.microsoft.com/office/powerpoint/2010/main" val="3047930190"/>
+      </p:ext>
+    </p:extLst>
+  </p:cSld>
+  <p:clrMapOvr>
+    <a:masterClrMapping/>
+  </p:clrMapOvr>
+</p:sld>
+</file>
+
+<file path=ppt/slides/slide17.xml><?xml version="1.0" encoding="utf-8"?>
 <p:sld xmlns:a="http://schemas.openxmlformats.org/drawingml/2006/main" xmlns:r="http://schemas.openxmlformats.org/officeDocument/2006/relationships" xmlns:p="http://schemas.openxmlformats.org/presentationml/2006/main">
   <p:cSld>
     <p:spTree>
@@ -5544,7 +6590,7 @@
         <p:spPr>
           <a:xfrm>
             <a:off x="691398" y="2109434"/>
-            <a:ext cx="3743814" cy="1569660"/>
+            <a:ext cx="3743814" cy="1323439"/>
           </a:xfrm>
           <a:prstGeom prst="rect">
             <a:avLst/>
@@ -5568,7 +6614,7 @@
                 <a:cs typeface="Calibir"/>
                 <a:sym typeface="Helvetica Neue"/>
               </a:rPr>
-              <a:t>En vista de la necesidad de control de inventario, de venta y de precio de los productos de un remate, CI Cash </a:t>
+              <a:t>En el presente documento se describirá el problema por el cual CI Cash </a:t>
             </a:r>
             <a:r>
               <a:rPr lang="es-ES" sz="1600" dirty="0" err="1">
@@ -5592,22 +6638,8 @@
                 <a:cs typeface="Calibir"/>
                 <a:sym typeface="Helvetica Neue"/>
               </a:rPr>
-              <a:t> se crea bajo la demanda observada para la optimización de tiempos en el proceso comercial.</a:t>
-            </a:r>
-            <a:endParaRPr kumimoji="0" lang="es-ES" sz="1600" b="1" i="0" u="none" strike="noStrike" cap="none" spc="0" normalizeH="0" baseline="0" dirty="0">
-              <a:ln>
-                <a:noFill/>
-              </a:ln>
-              <a:solidFill>
-                <a:srgbClr val="404040"/>
-              </a:solidFill>
-              <a:effectLst/>
-              <a:uFillTx/>
-              <a:latin typeface="Calibir"/>
-              <a:ea typeface="Helvetica Neue"/>
-              <a:cs typeface="Calibir"/>
-              <a:sym typeface="Helvetica Neue"/>
-            </a:endParaRPr>
+              <a:t> se creó, se visualizarán los objetivos del sistema de información, la justificación y el alcance del aplicativo web</a:t>
+            </a:r>
           </a:p>
         </p:txBody>
       </p:sp>
@@ -5969,7 +7001,7 @@
         </p:nvSpPr>
         <p:spPr>
           <a:xfrm>
-            <a:off x="4298842" y="775584"/>
+            <a:off x="4298842" y="1050772"/>
             <a:ext cx="2975141" cy="923330"/>
           </a:xfrm>
           <a:prstGeom prst="rect">
@@ -6005,7 +7037,7 @@
         </p:nvSpPr>
         <p:spPr>
           <a:xfrm>
-            <a:off x="4298842" y="1772925"/>
+            <a:off x="4298842" y="2213439"/>
             <a:ext cx="4265470" cy="1569660"/>
           </a:xfrm>
           <a:prstGeom prst="rect">
@@ -6019,6 +7051,7 @@
           </a:bodyPr>
           <a:lstStyle/>
           <a:p>
+            <a:pPr algn="just"/>
             <a:r>
               <a:rPr lang="es-ES" sz="1600" dirty="0">
                 <a:solidFill>
@@ -6028,7 +7061,29 @@
                   </a:schemeClr>
                 </a:solidFill>
               </a:rPr>
-              <a:t>Según las observaciones realizadas se visualiza en el proceso de venta que al consultar los productos en su inventario no existe un control de cantidades y esta validación se realiza en un sistema manual, adicional a esto no se conoce con precisión los precios de cada elemento.</a:t>
+              <a:t>En el siguiente apartado se describirá el problema obtenido a partir de la recolección de datos realizada en la empresa El Águila, se hablará de los procesos de forma detallada en los cuales CI Cash </a:t>
+            </a:r>
+            <a:r>
+              <a:rPr lang="es-ES" sz="1600" dirty="0" err="1">
+                <a:solidFill>
+                  <a:schemeClr val="tx1">
+                    <a:lumMod val="75000"/>
+                    <a:lumOff val="25000"/>
+                  </a:schemeClr>
+                </a:solidFill>
+              </a:rPr>
+              <a:t>Inventory</a:t>
+            </a:r>
+            <a:r>
+              <a:rPr lang="es-ES" sz="1600" dirty="0">
+                <a:solidFill>
+                  <a:schemeClr val="tx1">
+                    <a:lumMod val="75000"/>
+                    <a:lumOff val="25000"/>
+                  </a:schemeClr>
+                </a:solidFill>
+              </a:rPr>
+              <a:t> intervendrá para la mejora de los mismos.</a:t>
             </a:r>
           </a:p>
         </p:txBody>
@@ -6041,7 +7096,7 @@
         </p:nvSpPr>
         <p:spPr>
           <a:xfrm>
-            <a:off x="4387964" y="1653195"/>
+            <a:off x="4387964" y="2006941"/>
             <a:ext cx="718487" cy="45719"/>
           </a:xfrm>
           <a:prstGeom prst="rect">
@@ -6081,7 +7136,7 @@
       <p:sp>
         <p:nvSpPr>
           <p:cNvPr id="2" name="Rectángulo 1">
-            <a:hlinkClick r:id="rId2" action="ppaction://hlinksldjump"/>
+            <a:hlinkClick r:id="rId3" action="ppaction://hlinksldjump"/>
           </p:cNvPr>
           <p:cNvSpPr/>
           <p:nvPr/>
@@ -6137,7 +7192,7 @@
           <p:nvPr/>
         </p:nvPicPr>
         <p:blipFill>
-          <a:blip r:embed="rId3"/>
+          <a:blip r:embed="rId4"/>
           <a:stretch>
             <a:fillRect/>
           </a:stretch>
@@ -6167,7 +7222,7 @@
           <p:nvPr/>
         </p:nvPicPr>
         <p:blipFill rotWithShape="1">
-          <a:blip r:embed="rId4">
+          <a:blip r:embed="rId5">
             <a:extLst>
               <a:ext uri="{28A0092B-C50C-407E-A947-70E740481C1C}">
                 <a14:useLocalDpi xmlns:a14="http://schemas.microsoft.com/office/drawing/2010/main" val="0"/>
@@ -6268,8 +7323,8 @@
         </p:nvSpPr>
         <p:spPr>
           <a:xfrm>
-            <a:off x="382868" y="1052744"/>
-            <a:ext cx="8308126" cy="3785652"/>
+            <a:off x="417937" y="1519955"/>
+            <a:ext cx="8308126" cy="2554545"/>
           </a:xfrm>
           <a:prstGeom prst="rect">
             <a:avLst/>
@@ -6281,6 +7336,21 @@
           </a:bodyPr>
           <a:lstStyle/>
           <a:p>
+            <a:pPr algn="just"/>
+            <a:r>
+              <a:rPr lang="es-ES" sz="1600" dirty="0">
+                <a:solidFill>
+                  <a:schemeClr val="tx1">
+                    <a:lumMod val="75000"/>
+                    <a:lumOff val="25000"/>
+                  </a:schemeClr>
+                </a:solidFill>
+              </a:rPr>
+              <a:t>	Para la creación del sistema de información se realiza recolección de datos en el remate El Águila, esta es una tienda del barrio Bosa Brasil donde se pueden encontrar variedad de productos tales como papelería, accesorios, decoraciones navideñas, juguetería, etc.</a:t>
+            </a:r>
+          </a:p>
+          <a:p>
+            <a:pPr algn="just"/>
             <a:endParaRPr lang="es-ES" sz="1600" dirty="0">
               <a:solidFill>
                 <a:schemeClr val="tx1">
@@ -6291,17 +7361,7 @@
             </a:endParaRPr>
           </a:p>
           <a:p>
-            <a:r>
-              <a:rPr lang="es-ES" sz="1600" b="1" dirty="0">
-                <a:solidFill>
-                  <a:schemeClr val="tx1">
-                    <a:lumMod val="75000"/>
-                    <a:lumOff val="25000"/>
-                  </a:schemeClr>
-                </a:solidFill>
-              </a:rPr>
-              <a:t>Empresa: </a:t>
-            </a:r>
+            <a:pPr algn="just"/>
             <a:r>
               <a:rPr lang="es-ES" sz="1600" dirty="0">
                 <a:solidFill>
@@ -6311,94 +7371,11 @@
                   </a:schemeClr>
                 </a:solidFill>
               </a:rPr>
-              <a:t>El remate El Águila, es una tienda del barrio Bosa Brasil donde se pueden encontrar variedad de productos tales como papelería, accesorios, decoraciones navideñas, juguetería, etc.</a:t>
-            </a:r>
-          </a:p>
-          <a:p>
-            <a:r>
-              <a:rPr lang="es-ES" sz="1600" b="1" dirty="0">
-                <a:solidFill>
-                  <a:schemeClr val="tx1">
-                    <a:lumMod val="75000"/>
-                    <a:lumOff val="25000"/>
-                  </a:schemeClr>
-                </a:solidFill>
-              </a:rPr>
-              <a:t>Procesos en los que se va a intervenir : </a:t>
-            </a:r>
-            <a:r>
-              <a:rPr lang="es-ES" sz="1600" dirty="0">
-                <a:solidFill>
-                  <a:schemeClr val="tx1">
-                    <a:lumMod val="75000"/>
-                    <a:lumOff val="25000"/>
-                  </a:schemeClr>
-                </a:solidFill>
-              </a:rPr>
-              <a:t>Proceso de venta de productos, Proceso de Inventario</a:t>
-            </a:r>
-          </a:p>
-          <a:p>
-            <a:r>
-              <a:rPr lang="es-ES" sz="1600" b="1" dirty="0">
-                <a:solidFill>
-                  <a:schemeClr val="tx1">
-                    <a:lumMod val="75000"/>
-                    <a:lumOff val="25000"/>
-                  </a:schemeClr>
-                </a:solidFill>
-              </a:rPr>
-              <a:t>Análisis de Información: </a:t>
-            </a:r>
-            <a:r>
-              <a:rPr lang="es-ES" sz="1600" dirty="0">
-                <a:solidFill>
-                  <a:schemeClr val="tx1">
-                    <a:lumMod val="75000"/>
-                    <a:lumOff val="25000"/>
-                  </a:schemeClr>
-                </a:solidFill>
-              </a:rPr>
-              <a:t>Entrevista (Entrevista con el encargado del remate). Observación Directa (Diario de Campo donde se visualizan los procesos afectados). </a:t>
-            </a:r>
-          </a:p>
-          <a:p>
-            <a:r>
-              <a:rPr lang="es-ES" sz="1600" b="1" dirty="0">
-                <a:solidFill>
-                  <a:schemeClr val="tx1">
-                    <a:lumMod val="75000"/>
-                    <a:lumOff val="25000"/>
-                  </a:schemeClr>
-                </a:solidFill>
-              </a:rPr>
-              <a:t>Necesidades: </a:t>
-            </a:r>
-            <a:r>
-              <a:rPr lang="es-ES" sz="1600" dirty="0">
-                <a:solidFill>
-                  <a:schemeClr val="tx1">
-                    <a:lumMod val="75000"/>
-                    <a:lumOff val="25000"/>
-                  </a:schemeClr>
-                </a:solidFill>
-              </a:rPr>
-              <a:t>Proceso de venta (Los clientes se acercan a la tienda donde consultan el producto necesitado, los vendedores se lo entregan indicando su precio y finalizando el procedimiento, se evidencia que los trabajadores del remate no conocen con exactitud todos los precios de los productos, y en ocasiones hay demoras para consultar si el producto se encuentra en tienda o Bodega). </a:t>
-            </a:r>
-          </a:p>
-          <a:p>
-            <a:r>
-              <a:rPr lang="es-ES" sz="1600" dirty="0">
-                <a:solidFill>
-                  <a:schemeClr val="tx1">
-                    <a:lumMod val="75000"/>
-                    <a:lumOff val="25000"/>
-                  </a:schemeClr>
-                </a:solidFill>
-              </a:rPr>
-              <a:t>Proceso de inventario (Se trasladan productos a tienda desde bodega solo al visualizar pocas unidades de estos, en Bodega no tienen un control del stock de los productos por lo que se puede llegar a comprar demasiados o por lo contrario no comprar alguno hasta que ya no haya existencias del mismo). </a:t>
-            </a:r>
-            <a:endParaRPr lang="es-ES_tradnl" sz="1600" dirty="0">
+              <a:t>	Se visualizan dos procesos importantes donde se puede intervenir tales como el proceso de venta de productos y en el proceso de inventario, para encontrar la forma adecuada de abordaje a los mismos se realiza una entrevista al encargado del remate con el fin de saber como lo administra, de igual se realizan visitas a la tienda donde por medio de observación directa se extrae un diario de campo donde se profundiza en los procesos afectados.</a:t>
+            </a:r>
+          </a:p>
+          <a:p>
+            <a:endParaRPr lang="es-ES" sz="1600" dirty="0">
               <a:solidFill>
                 <a:schemeClr val="tx1">
                   <a:lumMod val="75000"/>
@@ -6497,6 +7474,217 @@
 </file>
 
 <file path=ppt/slides/slide6.xml><?xml version="1.0" encoding="utf-8"?>
+<p:sld xmlns:a="http://schemas.openxmlformats.org/drawingml/2006/main" xmlns:r="http://schemas.openxmlformats.org/officeDocument/2006/relationships" xmlns:p="http://schemas.openxmlformats.org/presentationml/2006/main">
+  <p:cSld>
+    <p:spTree>
+      <p:nvGrpSpPr>
+        <p:cNvPr id="1" name=""/>
+        <p:cNvGrpSpPr/>
+        <p:nvPr/>
+      </p:nvGrpSpPr>
+      <p:grpSpPr>
+        <a:xfrm>
+          <a:off x="0" y="0"/>
+          <a:ext cx="0" cy="0"/>
+          <a:chOff x="0" y="0"/>
+          <a:chExt cx="0" cy="0"/>
+        </a:xfrm>
+      </p:grpSpPr>
+      <p:sp>
+        <p:nvSpPr>
+          <p:cNvPr id="2" name="CuadroTexto 1"/>
+          <p:cNvSpPr txBox="1"/>
+          <p:nvPr/>
+        </p:nvSpPr>
+        <p:spPr>
+          <a:xfrm>
+            <a:off x="382868" y="249495"/>
+            <a:ext cx="2389387" cy="646331"/>
+          </a:xfrm>
+          <a:prstGeom prst="rect">
+            <a:avLst/>
+          </a:prstGeom>
+          <a:noFill/>
+        </p:spPr>
+        <p:txBody>
+          <a:bodyPr wrap="square" rtlCol="0">
+            <a:spAutoFit/>
+          </a:bodyPr>
+          <a:lstStyle/>
+          <a:p>
+            <a:r>
+              <a:rPr lang="es-ES" sz="3600" b="1" dirty="0">
+                <a:solidFill>
+                  <a:schemeClr val="bg1"/>
+                </a:solidFill>
+              </a:rPr>
+              <a:t>Problema</a:t>
+            </a:r>
+          </a:p>
+        </p:txBody>
+      </p:sp>
+      <p:sp>
+        <p:nvSpPr>
+          <p:cNvPr id="5" name="Rectángulo 4"/>
+          <p:cNvSpPr/>
+          <p:nvPr/>
+        </p:nvSpPr>
+        <p:spPr>
+          <a:xfrm>
+            <a:off x="417937" y="1523940"/>
+            <a:ext cx="8308126" cy="2800767"/>
+          </a:xfrm>
+          <a:prstGeom prst="rect">
+            <a:avLst/>
+          </a:prstGeom>
+        </p:spPr>
+        <p:txBody>
+          <a:bodyPr wrap="square">
+            <a:spAutoFit/>
+          </a:bodyPr>
+          <a:lstStyle/>
+          <a:p>
+            <a:pPr algn="just"/>
+            <a:r>
+              <a:rPr lang="es-ES" sz="1600" dirty="0">
+                <a:solidFill>
+                  <a:schemeClr val="tx1">
+                    <a:lumMod val="75000"/>
+                    <a:lumOff val="25000"/>
+                  </a:schemeClr>
+                </a:solidFill>
+              </a:rPr>
+              <a:t>	En el análisis de información encontramos que en el proceso de venta los clientes se acercan a la tienda donde consultan el producto necesitado, los vendedores se lo entregan indicando su precio y finalizando el procedimiento, se evidencia que los trabajadores del remate no conocen con exactitud todos los precios de los productos, así mismo en ocasiones hay demoras para consultar si el producto se encuentra en tienda o Bodega.</a:t>
+            </a:r>
+          </a:p>
+          <a:p>
+            <a:pPr algn="just"/>
+            <a:r>
+              <a:rPr lang="es-ES" sz="1600" dirty="0">
+                <a:solidFill>
+                  <a:schemeClr val="tx1">
+                    <a:lumMod val="75000"/>
+                    <a:lumOff val="25000"/>
+                  </a:schemeClr>
+                </a:solidFill>
+              </a:rPr>
+              <a:t> </a:t>
+            </a:r>
+          </a:p>
+          <a:p>
+            <a:pPr algn="just"/>
+            <a:r>
+              <a:rPr lang="es-ES" sz="1600" dirty="0">
+                <a:solidFill>
+                  <a:schemeClr val="tx1">
+                    <a:lumMod val="75000"/>
+                    <a:lumOff val="25000"/>
+                  </a:schemeClr>
+                </a:solidFill>
+              </a:rPr>
+              <a:t>	En el proceso de inventario se trasladan productos a tienda desde bodega solo al visualizar pocas unidades de estos, en Bodega no tienen un control exacto del stock de los productos por lo que se puede llegar a comprar demasiados o por lo contrario no comprar alguno hasta que ya no haya existencias del mismo.</a:t>
+            </a:r>
+          </a:p>
+          <a:p>
+            <a:endParaRPr lang="es-ES" sz="1600" dirty="0">
+              <a:solidFill>
+                <a:schemeClr val="tx1">
+                  <a:lumMod val="75000"/>
+                  <a:lumOff val="25000"/>
+                </a:schemeClr>
+              </a:solidFill>
+            </a:endParaRPr>
+          </a:p>
+        </p:txBody>
+      </p:sp>
+      <p:sp>
+        <p:nvSpPr>
+          <p:cNvPr id="6" name="Rectángulo 5">
+            <a:hlinkClick r:id="rId2" action="ppaction://hlinksldjump"/>
+          </p:cNvPr>
+          <p:cNvSpPr/>
+          <p:nvPr/>
+        </p:nvSpPr>
+        <p:spPr>
+          <a:xfrm>
+            <a:off x="8212822" y="192947"/>
+            <a:ext cx="746620" cy="679508"/>
+          </a:xfrm>
+          <a:prstGeom prst="rect">
+            <a:avLst/>
+          </a:prstGeom>
+          <a:noFill/>
+          <a:ln>
+            <a:noFill/>
+          </a:ln>
+        </p:spPr>
+        <p:style>
+          <a:lnRef idx="1">
+            <a:schemeClr val="accent1"/>
+          </a:lnRef>
+          <a:fillRef idx="3">
+            <a:schemeClr val="accent1"/>
+          </a:fillRef>
+          <a:effectRef idx="2">
+            <a:schemeClr val="accent1"/>
+          </a:effectRef>
+          <a:fontRef idx="minor">
+            <a:schemeClr val="lt1"/>
+          </a:fontRef>
+        </p:style>
+        <p:txBody>
+          <a:bodyPr rtlCol="0" anchor="ctr"/>
+          <a:lstStyle/>
+          <a:p>
+            <a:pPr algn="ctr"/>
+            <a:endParaRPr lang="es-CO"/>
+          </a:p>
+        </p:txBody>
+      </p:sp>
+      <p:pic>
+        <p:nvPicPr>
+          <p:cNvPr id="7" name="Imagen 6">
+            <a:extLst>
+              <a:ext uri="{FF2B5EF4-FFF2-40B4-BE49-F238E27FC236}">
+                <a16:creationId xmlns:a16="http://schemas.microsoft.com/office/drawing/2014/main" id="{02991D4D-DC0F-47DA-966B-9D3C312A5C60}"/>
+              </a:ext>
+            </a:extLst>
+          </p:cNvPr>
+          <p:cNvPicPr>
+            <a:picLocks noChangeAspect="1"/>
+          </p:cNvPicPr>
+          <p:nvPr/>
+        </p:nvPicPr>
+        <p:blipFill>
+          <a:blip r:embed="rId3"/>
+          <a:stretch>
+            <a:fillRect/>
+          </a:stretch>
+        </p:blipFill>
+        <p:spPr>
+          <a:xfrm>
+            <a:off x="8129483" y="4194618"/>
+            <a:ext cx="844594" cy="844594"/>
+          </a:xfrm>
+          <a:prstGeom prst="rect">
+            <a:avLst/>
+          </a:prstGeom>
+        </p:spPr>
+      </p:pic>
+    </p:spTree>
+    <p:extLst>
+      <p:ext uri="{BB962C8B-B14F-4D97-AF65-F5344CB8AC3E}">
+        <p14:creationId xmlns:p14="http://schemas.microsoft.com/office/powerpoint/2010/main" val="984477006"/>
+      </p:ext>
+    </p:extLst>
+  </p:cSld>
+  <p:clrMapOvr>
+    <a:masterClrMapping/>
+  </p:clrMapOvr>
+</p:sld>
+</file>
+
+<file path=ppt/slides/slide7.xml><?xml version="1.0" encoding="utf-8"?>
 <p:sld xmlns:a="http://schemas.openxmlformats.org/drawingml/2006/main" xmlns:r="http://schemas.openxmlformats.org/officeDocument/2006/relationships" xmlns:p="http://schemas.openxmlformats.org/presentationml/2006/main">
   <p:cSld>
     <p:spTree>
@@ -6550,7 +7738,7 @@
         </p:nvSpPr>
         <p:spPr>
           <a:xfrm>
-            <a:off x="4619687" y="1062146"/>
+            <a:off x="4619687" y="995401"/>
             <a:ext cx="2975141" cy="923330"/>
           </a:xfrm>
           <a:prstGeom prst="rect">
@@ -6586,8 +7774,8 @@
         </p:nvSpPr>
         <p:spPr>
           <a:xfrm>
-            <a:off x="4700026" y="2289439"/>
-            <a:ext cx="3389410" cy="923330"/>
+            <a:off x="4700026" y="2149116"/>
+            <a:ext cx="3676412" cy="1754326"/>
           </a:xfrm>
           <a:prstGeom prst="rect">
             <a:avLst/>
@@ -6600,6 +7788,7 @@
           </a:bodyPr>
           <a:lstStyle/>
           <a:p>
+            <a:pPr algn="just"/>
             <a:r>
               <a:rPr lang="es-ES" dirty="0">
                 <a:solidFill>
@@ -6609,7 +7798,29 @@
                   </a:schemeClr>
                 </a:solidFill>
               </a:rPr>
-              <a:t>Optimizar los procesos de almacenado y venta de productos en el Remate “El Águila”</a:t>
+              <a:t>En el siguiente apartado se mencionará el objetivo específico  de CI Cash </a:t>
+            </a:r>
+            <a:r>
+              <a:rPr lang="es-ES" dirty="0" err="1">
+                <a:solidFill>
+                  <a:schemeClr val="tx1">
+                    <a:lumMod val="75000"/>
+                    <a:lumOff val="25000"/>
+                  </a:schemeClr>
+                </a:solidFill>
+              </a:rPr>
+              <a:t>Inventory</a:t>
+            </a:r>
+            <a:r>
+              <a:rPr lang="es-ES" dirty="0">
+                <a:solidFill>
+                  <a:schemeClr val="tx1">
+                    <a:lumMod val="75000"/>
+                    <a:lumOff val="25000"/>
+                  </a:schemeClr>
+                </a:solidFill>
+              </a:rPr>
+              <a:t>, así mismo de forma modular se listarán los objetivos específicos necesarios para dar cumplimiento a la meta principal.</a:t>
             </a:r>
           </a:p>
         </p:txBody>
@@ -6622,7 +7833,7 @@
         </p:nvSpPr>
         <p:spPr>
           <a:xfrm>
-            <a:off x="4808454" y="1988677"/>
+            <a:off x="4808454" y="1918731"/>
             <a:ext cx="718487" cy="45719"/>
           </a:xfrm>
           <a:prstGeom prst="rect">
@@ -6746,7 +7957,7 @@
 </p:sld>
 </file>
 
-<file path=ppt/slides/slide7.xml><?xml version="1.0" encoding="utf-8"?>
+<file path=ppt/slides/slide8.xml><?xml version="1.0" encoding="utf-8"?>
 <p:sld xmlns:a="http://schemas.openxmlformats.org/drawingml/2006/main" xmlns:r="http://schemas.openxmlformats.org/officeDocument/2006/relationships" xmlns:p="http://schemas.openxmlformats.org/presentationml/2006/main">
   <p:cSld>
     <p:spTree>
@@ -6804,7 +8015,7 @@
         </p:nvSpPr>
         <p:spPr>
           <a:xfrm>
-            <a:off x="382867" y="1232954"/>
+            <a:off x="358527" y="1224652"/>
             <a:ext cx="8347475" cy="1323439"/>
           </a:xfrm>
           <a:prstGeom prst="rect">
@@ -6883,8 +8094,8 @@
         </p:nvSpPr>
         <p:spPr>
           <a:xfrm>
-            <a:off x="382866" y="2286737"/>
-            <a:ext cx="8347475" cy="2554545"/>
+            <a:off x="358527" y="2388238"/>
+            <a:ext cx="8347475" cy="2062103"/>
           </a:xfrm>
           <a:prstGeom prst="rect">
             <a:avLst/>
@@ -6909,10 +8120,6 @@
             </a:r>
           </a:p>
           <a:p>
-            <a:pPr marL="342900" indent="-342900">
-              <a:buFont typeface="+mj-lt"/>
-              <a:buAutoNum type="arabicPeriod"/>
-            </a:pPr>
             <a:endParaRPr lang="es-ES_tradnl" sz="1600" dirty="0">
               <a:solidFill>
                 <a:schemeClr val="tx1">
@@ -6970,24 +8177,7 @@
                   </a:schemeClr>
                 </a:solidFill>
               </a:rPr>
-              <a:t>Informar la escasez de un producto para que la Empresa el Águila sea reabastecida en el momento adecuado.</a:t>
-            </a:r>
-          </a:p>
-          <a:p>
-            <a:pPr marL="800100" lvl="1" indent="-342900">
-              <a:buFont typeface="Arial" panose="020B0604020202020204" pitchFamily="34" charset="0"/>
-              <a:buChar char="•"/>
-            </a:pPr>
-            <a:r>
-              <a:rPr lang="es-ES" sz="1600" dirty="0">
-                <a:solidFill>
-                  <a:schemeClr val="tx1">
-                    <a:lumMod val="75000"/>
-                    <a:lumOff val="25000"/>
-                  </a:schemeClr>
-                </a:solidFill>
-              </a:rPr>
-              <a:t>Optimizar el tiempo de venta, dando a conocer los precios y descontando la existencia del producto en el inventario de la Empresa el Águila</a:t>
+              <a:t>Gestionar el proceso de venta, dando a conocer los precios y descontando la existencia del producto en el inventario de la Empresa el Águila</a:t>
             </a:r>
           </a:p>
           <a:p>
@@ -7208,7 +8398,7 @@
 </p:sld>
 </file>
 
-<file path=ppt/slides/slide8.xml><?xml version="1.0" encoding="utf-8"?>
+<file path=ppt/slides/slide9.xml><?xml version="1.0" encoding="utf-8"?>
 <p:sld xmlns:a="http://schemas.openxmlformats.org/drawingml/2006/main" xmlns:r="http://schemas.openxmlformats.org/officeDocument/2006/relationships" xmlns:p="http://schemas.openxmlformats.org/presentationml/2006/main">
   <p:cSld>
     <p:spTree>
@@ -7278,7 +8468,7 @@
         </p:nvSpPr>
         <p:spPr>
           <a:xfrm>
-            <a:off x="4231603" y="726903"/>
+            <a:off x="4354529" y="896651"/>
             <a:ext cx="3702686" cy="923330"/>
           </a:xfrm>
           <a:prstGeom prst="rect">
@@ -7314,8 +8504,8 @@
         </p:nvSpPr>
         <p:spPr>
           <a:xfrm>
-            <a:off x="4324148" y="2036390"/>
-            <a:ext cx="4231603" cy="1569660"/>
+            <a:off x="4354529" y="2169829"/>
+            <a:ext cx="4231603" cy="1323439"/>
           </a:xfrm>
           <a:prstGeom prst="rect">
             <a:avLst/>
@@ -7328,6 +8518,7 @@
           </a:bodyPr>
           <a:lstStyle/>
           <a:p>
+            <a:pPr algn="just"/>
             <a:r>
               <a:rPr lang="es-ES" sz="1600" dirty="0">
                 <a:solidFill>
@@ -7337,7 +8528,7 @@
                   </a:schemeClr>
                 </a:solidFill>
               </a:rPr>
-              <a:t>En evidencia de la necesidad de una adecuada organización para optimización de procesos de almacenado y venta y de falencias vistas en los métodos de recolección de datos, nace CI Cash </a:t>
+              <a:t>En el siguiente apartado se hablará del porqué es necesaria la creación de CI Cash </a:t>
             </a:r>
             <a:r>
               <a:rPr lang="es-ES" sz="1600" dirty="0" err="1">
@@ -7359,7 +8550,7 @@
                   </a:schemeClr>
                 </a:solidFill>
               </a:rPr>
-              <a:t> con el fin de sistematizar y apoyar a la empresa el Águila.</a:t>
+              <a:t> y cómo se dará solución a las diferentes problemáticas expuestas en los procesos a intervenir.</a:t>
             </a:r>
           </a:p>
         </p:txBody>
@@ -7372,7 +8563,7 @@
         </p:nvSpPr>
         <p:spPr>
           <a:xfrm>
-            <a:off x="4397567" y="1705319"/>
+            <a:off x="4397567" y="1896430"/>
             <a:ext cx="718487" cy="45719"/>
           </a:xfrm>
           <a:prstGeom prst="rect">
@@ -7487,285 +8678,6 @@
     <p:extLst>
       <p:ext uri="{BB962C8B-B14F-4D97-AF65-F5344CB8AC3E}">
         <p14:creationId xmlns:p14="http://schemas.microsoft.com/office/powerpoint/2010/main" val="760866535"/>
-      </p:ext>
-    </p:extLst>
-  </p:cSld>
-  <p:clrMapOvr>
-    <a:masterClrMapping/>
-  </p:clrMapOvr>
-</p:sld>
-</file>
-
-<file path=ppt/slides/slide9.xml><?xml version="1.0" encoding="utf-8"?>
-<p:sld xmlns:a="http://schemas.openxmlformats.org/drawingml/2006/main" xmlns:r="http://schemas.openxmlformats.org/officeDocument/2006/relationships" xmlns:p="http://schemas.openxmlformats.org/presentationml/2006/main">
-  <p:cSld>
-    <p:spTree>
-      <p:nvGrpSpPr>
-        <p:cNvPr id="1" name=""/>
-        <p:cNvGrpSpPr/>
-        <p:nvPr/>
-      </p:nvGrpSpPr>
-      <p:grpSpPr>
-        <a:xfrm>
-          <a:off x="0" y="0"/>
-          <a:ext cx="0" cy="0"/>
-          <a:chOff x="0" y="0"/>
-          <a:chExt cx="0" cy="0"/>
-        </a:xfrm>
-      </p:grpSpPr>
-      <p:sp>
-        <p:nvSpPr>
-          <p:cNvPr id="2" name="CuadroTexto 1"/>
-          <p:cNvSpPr txBox="1"/>
-          <p:nvPr/>
-        </p:nvSpPr>
-        <p:spPr>
-          <a:xfrm>
-            <a:off x="382868" y="249495"/>
-            <a:ext cx="2817532" cy="646331"/>
-          </a:xfrm>
-          <a:prstGeom prst="rect">
-            <a:avLst/>
-          </a:prstGeom>
-          <a:noFill/>
-        </p:spPr>
-        <p:txBody>
-          <a:bodyPr wrap="square" rtlCol="0">
-            <a:spAutoFit/>
-          </a:bodyPr>
-          <a:lstStyle/>
-          <a:p>
-            <a:r>
-              <a:rPr lang="es-ES" sz="3600" b="1" dirty="0">
-                <a:solidFill>
-                  <a:schemeClr val="bg1"/>
-                </a:solidFill>
-              </a:rPr>
-              <a:t>Justificación</a:t>
-            </a:r>
-          </a:p>
-        </p:txBody>
-      </p:sp>
-      <p:sp>
-        <p:nvSpPr>
-          <p:cNvPr id="8" name="Rectángulo 7"/>
-          <p:cNvSpPr/>
-          <p:nvPr/>
-        </p:nvSpPr>
-        <p:spPr>
-          <a:xfrm>
-            <a:off x="382868" y="1232954"/>
-            <a:ext cx="8308126" cy="3370153"/>
-          </a:xfrm>
-          <a:prstGeom prst="rect">
-            <a:avLst/>
-          </a:prstGeom>
-        </p:spPr>
-        <p:txBody>
-          <a:bodyPr wrap="square">
-            <a:spAutoFit/>
-          </a:bodyPr>
-          <a:lstStyle/>
-          <a:p>
-            <a:pPr algn="just"/>
-            <a:r>
-              <a:rPr lang="es-ES" sz="1500" dirty="0">
-                <a:solidFill>
-                  <a:schemeClr val="tx1">
-                    <a:lumMod val="75000"/>
-                    <a:lumOff val="25000"/>
-                  </a:schemeClr>
-                </a:solidFill>
-              </a:rPr>
-              <a:t>Se propone el desarrollo de un Sistema de Información Web denominado CI Cash </a:t>
-            </a:r>
-            <a:r>
-              <a:rPr lang="es-ES" sz="1500" dirty="0" err="1">
-                <a:solidFill>
-                  <a:schemeClr val="tx1">
-                    <a:lumMod val="75000"/>
-                    <a:lumOff val="25000"/>
-                  </a:schemeClr>
-                </a:solidFill>
-              </a:rPr>
-              <a:t>Inventory</a:t>
-            </a:r>
-            <a:r>
-              <a:rPr lang="es-ES" sz="1500" dirty="0">
-                <a:solidFill>
-                  <a:schemeClr val="tx1">
-                    <a:lumMod val="75000"/>
-                    <a:lumOff val="25000"/>
-                  </a:schemeClr>
-                </a:solidFill>
-              </a:rPr>
-              <a:t> que sirva como herramienta software de apoyo al seguimiento y optimización de los procesos de Venta e inventariado de la Empresa el Águila</a:t>
-            </a:r>
-          </a:p>
-          <a:p>
-            <a:pPr algn="just"/>
-            <a:r>
-              <a:rPr lang="es-ES" sz="1500" dirty="0">
-                <a:solidFill>
-                  <a:schemeClr val="tx1">
-                    <a:lumMod val="75000"/>
-                    <a:lumOff val="25000"/>
-                  </a:schemeClr>
-                </a:solidFill>
-              </a:rPr>
-              <a:t>Permitirá la gestión de los vendedores, de Bodega y del administrador como usuarios de la Empresa el Águila. En el proceso de venta los vendedores podrán consultar el precio del producto por medio de código de barras, existencias del mismo en tienda y bodega, generar factura de venta y descontar del inventario el elemento vendido. En el proceso de almacenado los usuarios con rol de bodega podrán ingresar productos al inventario, consultar el stock de los diferentes elementos, cambiar ubicación de los productos en la base de datos (de bodega a tienda), El usuario con rol de administrador podrá crear usuarios, modificar roles y finalmente, facilitará la gestión de reportes gráficos e impresos, necesarios para la toma de decisiones comerciales y administrativas del gerente en la Empresa el Águila</a:t>
-            </a:r>
-          </a:p>
-          <a:p>
-            <a:pPr algn="just"/>
-            <a:r>
-              <a:rPr lang="es-ES" sz="1500" dirty="0">
-                <a:solidFill>
-                  <a:schemeClr val="tx1">
-                    <a:lumMod val="75000"/>
-                    <a:lumOff val="25000"/>
-                  </a:schemeClr>
-                </a:solidFill>
-              </a:rPr>
-              <a:t>El Sistema CI Cash </a:t>
-            </a:r>
-            <a:r>
-              <a:rPr lang="es-ES" sz="1500" dirty="0" err="1">
-                <a:solidFill>
-                  <a:schemeClr val="tx1">
-                    <a:lumMod val="75000"/>
-                    <a:lumOff val="25000"/>
-                  </a:schemeClr>
-                </a:solidFill>
-              </a:rPr>
-              <a:t>Inventory</a:t>
-            </a:r>
-            <a:r>
-              <a:rPr lang="es-ES" sz="1500" dirty="0">
-                <a:solidFill>
-                  <a:schemeClr val="tx1">
-                    <a:lumMod val="75000"/>
-                    <a:lumOff val="25000"/>
-                  </a:schemeClr>
-                </a:solidFill>
-              </a:rPr>
-              <a:t> servirá como aporte al sector comercial como </a:t>
-            </a:r>
-            <a:r>
-              <a:rPr lang="es-MX" sz="1500" dirty="0">
-                <a:solidFill>
-                  <a:schemeClr val="tx1">
-                    <a:lumMod val="75000"/>
-                    <a:lumOff val="25000"/>
-                  </a:schemeClr>
-                </a:solidFill>
-              </a:rPr>
-              <a:t>herramienta de apoyo para venta y control de almacenado de productos</a:t>
-            </a:r>
-            <a:endParaRPr lang="es-ES_tradnl" sz="1500" dirty="0">
-              <a:solidFill>
-                <a:schemeClr val="tx1">
-                  <a:lumMod val="75000"/>
-                  <a:lumOff val="25000"/>
-                </a:schemeClr>
-              </a:solidFill>
-            </a:endParaRPr>
-          </a:p>
-          <a:p>
-            <a:pPr algn="just">
-              <a:tabLst>
-                <a:tab pos="268288" algn="l"/>
-              </a:tabLst>
-            </a:pPr>
-            <a:endParaRPr lang="es-ES_tradnl" sz="1600" dirty="0">
-              <a:solidFill>
-                <a:schemeClr val="tx1">
-                  <a:lumMod val="75000"/>
-                  <a:lumOff val="25000"/>
-                </a:schemeClr>
-              </a:solidFill>
-            </a:endParaRPr>
-          </a:p>
-        </p:txBody>
-      </p:sp>
-      <p:sp>
-        <p:nvSpPr>
-          <p:cNvPr id="9" name="Rectángulo 8">
-            <a:hlinkClick r:id="rId3" action="ppaction://hlinksldjump"/>
-          </p:cNvPr>
-          <p:cNvSpPr/>
-          <p:nvPr/>
-        </p:nvSpPr>
-        <p:spPr>
-          <a:xfrm>
-            <a:off x="8212822" y="192947"/>
-            <a:ext cx="746620" cy="679508"/>
-          </a:xfrm>
-          <a:prstGeom prst="rect">
-            <a:avLst/>
-          </a:prstGeom>
-          <a:noFill/>
-          <a:ln>
-            <a:noFill/>
-          </a:ln>
-        </p:spPr>
-        <p:style>
-          <a:lnRef idx="1">
-            <a:schemeClr val="accent1"/>
-          </a:lnRef>
-          <a:fillRef idx="3">
-            <a:schemeClr val="accent1"/>
-          </a:fillRef>
-          <a:effectRef idx="2">
-            <a:schemeClr val="accent1"/>
-          </a:effectRef>
-          <a:fontRef idx="minor">
-            <a:schemeClr val="lt1"/>
-          </a:fontRef>
-        </p:style>
-        <p:txBody>
-          <a:bodyPr rtlCol="0" anchor="ctr"/>
-          <a:lstStyle/>
-          <a:p>
-            <a:pPr algn="ctr"/>
-            <a:endParaRPr lang="es-CO"/>
-          </a:p>
-        </p:txBody>
-      </p:sp>
-      <p:pic>
-        <p:nvPicPr>
-          <p:cNvPr id="7" name="Imagen 6">
-            <a:extLst>
-              <a:ext uri="{FF2B5EF4-FFF2-40B4-BE49-F238E27FC236}">
-                <a16:creationId xmlns:a16="http://schemas.microsoft.com/office/drawing/2014/main" id="{5D771AA1-6376-4BF2-BF7D-083F4509AE6C}"/>
-              </a:ext>
-            </a:extLst>
-          </p:cNvPr>
-          <p:cNvPicPr>
-            <a:picLocks noChangeAspect="1"/>
-          </p:cNvPicPr>
-          <p:nvPr/>
-        </p:nvPicPr>
-        <p:blipFill>
-          <a:blip r:embed="rId4"/>
-          <a:stretch>
-            <a:fillRect/>
-          </a:stretch>
-        </p:blipFill>
-        <p:spPr>
-          <a:xfrm>
-            <a:off x="7966247" y="4031382"/>
-            <a:ext cx="1007830" cy="1007830"/>
-          </a:xfrm>
-          <a:prstGeom prst="rect">
-            <a:avLst/>
-          </a:prstGeom>
-        </p:spPr>
-      </p:pic>
-    </p:spTree>
-    <p:extLst>
-      <p:ext uri="{BB962C8B-B14F-4D97-AF65-F5344CB8AC3E}">
-        <p14:creationId xmlns:p14="http://schemas.microsoft.com/office/powerpoint/2010/main" val="4272611872"/>
       </p:ext>
     </p:extLst>
   </p:cSld>

</xml_diff>